<commit_message>
Update SNI tutorial schematics
</commit_message>
<xml_diff>
--- a/Tutorials/images/tuto_sni.pptx
+++ b/Tutorials/images/tuto_sni.pptx
@@ -1743,7 +1743,7 @@
                 </a:solidFill>
                 <a:latin typeface="Calibri"/>
               </a:rPr>
-              <a:t>20/10/2021</a:t>
+              <a:t>27/10/2021</a:t>
             </a:fld>
             <a:endParaRPr lang="en-GB" sz="1200" b="0" strike="noStrike" spc="-1">
               <a:latin typeface="Times New Roman"/>
@@ -2158,10 +2158,10 @@
         </p:nvGrpSpPr>
         <p:grpSpPr>
           <a:xfrm>
-            <a:off x="4416798" y="1410300"/>
-            <a:ext cx="3358404" cy="4037400"/>
+            <a:off x="4416798" y="1407894"/>
+            <a:ext cx="3358404" cy="4042211"/>
             <a:chOff x="3168360" y="700920"/>
-            <a:chExt cx="3358404" cy="4037400"/>
+            <a:chExt cx="3358404" cy="4042211"/>
           </a:xfrm>
         </p:grpSpPr>
         <p:sp>
@@ -2664,7 +2664,7 @@
           <p:spPr>
             <a:xfrm>
               <a:off x="3882942" y="4282920"/>
-              <a:ext cx="1929240" cy="455400"/>
+              <a:ext cx="1929240" cy="460211"/>
             </a:xfrm>
             <a:prstGeom prst="rect">
               <a:avLst/>
@@ -2705,7 +2705,27 @@
                   <a:latin typeface="Source Sans Pro Light"/>
                   <a:ea typeface="Source Sans Pro Light"/>
                 </a:rPr>
-                <a:t>The Java </a:t>
+                <a:t>The </a:t>
+              </a:r>
+              <a:r>
+                <a:rPr lang="en-GB" sz="1200" b="1" strike="noStrike" spc="-1" dirty="0" err="1">
+                  <a:solidFill>
+                    <a:srgbClr val="4B5357"/>
+                  </a:solidFill>
+                  <a:latin typeface="Source Sans Pro Light"/>
+                  <a:ea typeface="Source Sans Pro Light"/>
+                </a:rPr>
+                <a:t>MicroEJ</a:t>
+              </a:r>
+              <a:r>
+                <a:rPr lang="en-GB" sz="1200" b="1" strike="noStrike" spc="-1" dirty="0">
+                  <a:solidFill>
+                    <a:srgbClr val="4B5357"/>
+                  </a:solidFill>
+                  <a:latin typeface="Source Sans Pro Light"/>
+                  <a:ea typeface="Source Sans Pro Light"/>
+                </a:rPr>
+                <a:t> VEE </a:t>
               </a:r>
               <a:endParaRPr lang="en-GB" sz="1200" b="0" strike="noStrike" spc="-1" dirty="0">
                 <a:latin typeface="Arial"/>
@@ -2993,10 +3013,10 @@
       </p:grpSpPr>
       <p:grpSp>
         <p:nvGrpSpPr>
-          <p:cNvPr id="5" name="Groupe 4">
+          <p:cNvPr id="2" name="Groupe 1">
             <a:extLst>
               <a:ext uri="{FF2B5EF4-FFF2-40B4-BE49-F238E27FC236}">
-                <a16:creationId xmlns:a16="http://schemas.microsoft.com/office/drawing/2014/main" id="{04FB5DAB-C02F-4550-A1DF-26B45431C49E}"/>
+                <a16:creationId xmlns:a16="http://schemas.microsoft.com/office/drawing/2014/main" id="{C74013CF-DD8C-4B91-AF9C-CA50C7C749FF}"/>
               </a:ext>
             </a:extLst>
           </p:cNvPr>
@@ -3005,167 +3025,1476 @@
         </p:nvGrpSpPr>
         <p:grpSpPr>
           <a:xfrm>
-            <a:off x="2162372" y="1142068"/>
-            <a:ext cx="7867256" cy="4573863"/>
-            <a:chOff x="2914560" y="700920"/>
-            <a:chExt cx="7867256" cy="4573863"/>
+            <a:off x="2162372" y="1139663"/>
+            <a:ext cx="7867256" cy="4578674"/>
+            <a:chOff x="2162372" y="1142068"/>
+            <a:chExt cx="7867256" cy="4578674"/>
           </a:xfrm>
         </p:grpSpPr>
+        <p:grpSp>
+          <p:nvGrpSpPr>
+            <p:cNvPr id="5" name="Groupe 4">
+              <a:extLst>
+                <a:ext uri="{FF2B5EF4-FFF2-40B4-BE49-F238E27FC236}">
+                  <a16:creationId xmlns:a16="http://schemas.microsoft.com/office/drawing/2014/main" id="{04FB5DAB-C02F-4550-A1DF-26B45431C49E}"/>
+                </a:ext>
+              </a:extLst>
+            </p:cNvPr>
+            <p:cNvGrpSpPr/>
+            <p:nvPr/>
+          </p:nvGrpSpPr>
+          <p:grpSpPr>
+            <a:xfrm>
+              <a:off x="2162372" y="1142068"/>
+              <a:ext cx="7867256" cy="4578674"/>
+              <a:chOff x="2914560" y="700920"/>
+              <a:chExt cx="7867256" cy="4578674"/>
+            </a:xfrm>
+          </p:grpSpPr>
+          <p:sp>
+            <p:nvSpPr>
+              <p:cNvPr id="40" name="CustomShape 1"/>
+              <p:cNvSpPr/>
+              <p:nvPr/>
+            </p:nvSpPr>
+            <p:spPr>
+              <a:xfrm>
+                <a:off x="2914560" y="700920"/>
+                <a:ext cx="2621880" cy="4108484"/>
+              </a:xfrm>
+              <a:prstGeom prst="roundRect">
+                <a:avLst>
+                  <a:gd name="adj" fmla="val 5059"/>
+                </a:avLst>
+              </a:prstGeom>
+              <a:solidFill>
+                <a:srgbClr val="F2F2F2"/>
+              </a:solidFill>
+              <a:ln w="19080">
+                <a:noFill/>
+              </a:ln>
+            </p:spPr>
+            <p:style>
+              <a:lnRef idx="0">
+                <a:scrgbClr r="0" g="0" b="0"/>
+              </a:lnRef>
+              <a:fillRef idx="0">
+                <a:scrgbClr r="0" g="0" b="0"/>
+              </a:fillRef>
+              <a:effectRef idx="0">
+                <a:scrgbClr r="0" g="0" b="0"/>
+              </a:effectRef>
+              <a:fontRef idx="minor"/>
+            </p:style>
+          </p:sp>
+          <p:sp>
+            <p:nvSpPr>
+              <p:cNvPr id="41" name="CustomShape 2"/>
+              <p:cNvSpPr/>
+              <p:nvPr/>
+            </p:nvSpPr>
+            <p:spPr>
+              <a:xfrm>
+                <a:off x="9148527" y="706680"/>
+                <a:ext cx="1215720" cy="4102724"/>
+              </a:xfrm>
+              <a:prstGeom prst="roundRect">
+                <a:avLst>
+                  <a:gd name="adj" fmla="val 5059"/>
+                </a:avLst>
+              </a:prstGeom>
+              <a:solidFill>
+                <a:schemeClr val="bg1">
+                  <a:lumMod val="95000"/>
+                </a:schemeClr>
+              </a:solidFill>
+              <a:ln w="19080">
+                <a:noFill/>
+              </a:ln>
+            </p:spPr>
+            <p:style>
+              <a:lnRef idx="2">
+                <a:schemeClr val="accent1">
+                  <a:shade val="50000"/>
+                </a:schemeClr>
+              </a:lnRef>
+              <a:fillRef idx="1">
+                <a:schemeClr val="accent1"/>
+              </a:fillRef>
+              <a:effectRef idx="0">
+                <a:schemeClr val="accent1"/>
+              </a:effectRef>
+              <a:fontRef idx="minor"/>
+            </p:style>
+            <p:txBody>
+              <a:bodyPr/>
+              <a:lstStyle/>
+              <a:p>
+                <a:endParaRPr lang="en-US"/>
+              </a:p>
+            </p:txBody>
+          </p:sp>
+          <p:sp>
+            <p:nvSpPr>
+              <p:cNvPr id="44" name="CustomShape 5"/>
+              <p:cNvSpPr/>
+              <p:nvPr/>
+            </p:nvSpPr>
+            <p:spPr>
+              <a:xfrm rot="5400000">
+                <a:off x="2643463" y="1312560"/>
+                <a:ext cx="1241640" cy="338760"/>
+              </a:xfrm>
+              <a:prstGeom prst="rightArrow">
+                <a:avLst>
+                  <a:gd name="adj1" fmla="val 100000"/>
+                  <a:gd name="adj2" fmla="val 41015"/>
+                </a:avLst>
+              </a:prstGeom>
+              <a:solidFill>
+                <a:srgbClr val="6CC24A"/>
+              </a:solidFill>
+              <a:ln>
+                <a:noFill/>
+              </a:ln>
+            </p:spPr>
+            <p:style>
+              <a:lnRef idx="0">
+                <a:scrgbClr r="0" g="0" b="0"/>
+              </a:lnRef>
+              <a:fillRef idx="0">
+                <a:scrgbClr r="0" g="0" b="0"/>
+              </a:fillRef>
+              <a:effectRef idx="0">
+                <a:scrgbClr r="0" g="0" b="0"/>
+              </a:effectRef>
+              <a:fontRef idx="minor"/>
+            </p:style>
+            <p:txBody>
+              <a:bodyPr lIns="90000" tIns="45000" rIns="90000" bIns="45000" anchor="ctr">
+                <a:noAutofit/>
+              </a:bodyPr>
+              <a:lstStyle/>
+              <a:p>
+                <a:pPr algn="ctr">
+                  <a:lnSpc>
+                    <a:spcPct val="100000"/>
+                  </a:lnSpc>
+                </a:pPr>
+                <a:r>
+                  <a:rPr lang="en-GB" sz="1100" b="0" strike="noStrike" spc="-1" dirty="0">
+                    <a:solidFill>
+                      <a:srgbClr val="FFFFFF"/>
+                    </a:solidFill>
+                    <a:latin typeface="Source Sans Pro"/>
+                  </a:rPr>
+                  <a:t>Green thread 1</a:t>
+                </a:r>
+                <a:endParaRPr lang="en-GB" sz="1100" b="0" strike="noStrike" spc="-1" dirty="0">
+                  <a:latin typeface="Arial"/>
+                </a:endParaRPr>
+              </a:p>
+            </p:txBody>
+          </p:sp>
+          <p:sp>
+            <p:nvSpPr>
+              <p:cNvPr id="45" name="CustomShape 6"/>
+              <p:cNvSpPr/>
+              <p:nvPr/>
+            </p:nvSpPr>
+            <p:spPr>
+              <a:xfrm rot="5400000">
+                <a:off x="2783650" y="3070761"/>
+                <a:ext cx="961266" cy="338760"/>
+              </a:xfrm>
+              <a:prstGeom prst="rect">
+                <a:avLst/>
+              </a:prstGeom>
+              <a:solidFill>
+                <a:srgbClr val="6CC24A"/>
+              </a:solidFill>
+              <a:ln>
+                <a:noFill/>
+              </a:ln>
+            </p:spPr>
+            <p:style>
+              <a:lnRef idx="0">
+                <a:scrgbClr r="0" g="0" b="0"/>
+              </a:lnRef>
+              <a:fillRef idx="0">
+                <a:scrgbClr r="0" g="0" b="0"/>
+              </a:fillRef>
+              <a:effectRef idx="0">
+                <a:scrgbClr r="0" g="0" b="0"/>
+              </a:effectRef>
+              <a:fontRef idx="minor"/>
+            </p:style>
+            <p:txBody>
+              <a:bodyPr lIns="90000" tIns="45000" rIns="90000" bIns="45000" anchor="ctr">
+                <a:noAutofit/>
+              </a:bodyPr>
+              <a:lstStyle/>
+              <a:p>
+                <a:pPr algn="ctr">
+                  <a:lnSpc>
+                    <a:spcPct val="100000"/>
+                  </a:lnSpc>
+                </a:pPr>
+                <a:r>
+                  <a:rPr lang="en-GB" sz="1250" spc="-1" dirty="0">
+                    <a:solidFill>
+                      <a:srgbClr val="FFFFFF"/>
+                    </a:solidFill>
+                    <a:latin typeface="Source Sans Pro"/>
+                  </a:rPr>
+                  <a:t>1</a:t>
+                </a:r>
+                <a:endParaRPr lang="en-GB" sz="1250" b="0" strike="noStrike" spc="-1" dirty="0">
+                  <a:latin typeface="Arial"/>
+                </a:endParaRPr>
+              </a:p>
+            </p:txBody>
+          </p:sp>
+          <p:sp>
+            <p:nvSpPr>
+              <p:cNvPr id="46" name="CustomShape 7"/>
+              <p:cNvSpPr/>
+              <p:nvPr/>
+            </p:nvSpPr>
+            <p:spPr>
+              <a:xfrm rot="5400000">
+                <a:off x="3144583" y="1312560"/>
+                <a:ext cx="1241640" cy="338760"/>
+              </a:xfrm>
+              <a:prstGeom prst="rightArrow">
+                <a:avLst>
+                  <a:gd name="adj1" fmla="val 100000"/>
+                  <a:gd name="adj2" fmla="val 41015"/>
+                </a:avLst>
+              </a:prstGeom>
+              <a:solidFill>
+                <a:srgbClr val="6CC24A"/>
+              </a:solidFill>
+              <a:ln>
+                <a:noFill/>
+              </a:ln>
+            </p:spPr>
+            <p:style>
+              <a:lnRef idx="0">
+                <a:scrgbClr r="0" g="0" b="0"/>
+              </a:lnRef>
+              <a:fillRef idx="0">
+                <a:scrgbClr r="0" g="0" b="0"/>
+              </a:fillRef>
+              <a:effectRef idx="0">
+                <a:scrgbClr r="0" g="0" b="0"/>
+              </a:effectRef>
+              <a:fontRef idx="minor"/>
+            </p:style>
+            <p:txBody>
+              <a:bodyPr lIns="90000" tIns="45000" rIns="90000" bIns="45000" anchor="ctr">
+                <a:noAutofit/>
+              </a:bodyPr>
+              <a:lstStyle/>
+              <a:p>
+                <a:pPr algn="ctr">
+                  <a:lnSpc>
+                    <a:spcPct val="100000"/>
+                  </a:lnSpc>
+                </a:pPr>
+                <a:r>
+                  <a:rPr lang="en-GB" sz="1100" b="0" strike="noStrike" spc="-1" dirty="0">
+                    <a:solidFill>
+                      <a:srgbClr val="FFFFFF"/>
+                    </a:solidFill>
+                    <a:latin typeface="Source Sans Pro"/>
+                  </a:rPr>
+                  <a:t>Green thread 2</a:t>
+                </a:r>
+                <a:endParaRPr lang="en-GB" sz="1100" b="0" strike="noStrike" spc="-1" dirty="0">
+                  <a:latin typeface="Arial"/>
+                </a:endParaRPr>
+              </a:p>
+            </p:txBody>
+          </p:sp>
+          <p:sp>
+            <p:nvSpPr>
+              <p:cNvPr id="47" name="CustomShape 8"/>
+              <p:cNvSpPr/>
+              <p:nvPr/>
+            </p:nvSpPr>
+            <p:spPr>
+              <a:xfrm rot="5400000">
+                <a:off x="3498574" y="4296129"/>
+                <a:ext cx="533658" cy="338760"/>
+              </a:xfrm>
+              <a:prstGeom prst="rightArrow">
+                <a:avLst>
+                  <a:gd name="adj1" fmla="val 100000"/>
+                  <a:gd name="adj2" fmla="val 41015"/>
+                </a:avLst>
+              </a:prstGeom>
+              <a:solidFill>
+                <a:srgbClr val="6CC24A"/>
+              </a:solidFill>
+              <a:ln>
+                <a:noFill/>
+              </a:ln>
+            </p:spPr>
+            <p:style>
+              <a:lnRef idx="0">
+                <a:scrgbClr r="0" g="0" b="0"/>
+              </a:lnRef>
+              <a:fillRef idx="0">
+                <a:scrgbClr r="0" g="0" b="0"/>
+              </a:fillRef>
+              <a:effectRef idx="0">
+                <a:scrgbClr r="0" g="0" b="0"/>
+              </a:effectRef>
+              <a:fontRef idx="minor"/>
+            </p:style>
+            <p:txBody>
+              <a:bodyPr lIns="90000" tIns="45000" rIns="90000" bIns="45000" anchor="ctr">
+                <a:noAutofit/>
+              </a:bodyPr>
+              <a:lstStyle/>
+              <a:p>
+                <a:pPr algn="ctr">
+                  <a:lnSpc>
+                    <a:spcPct val="100000"/>
+                  </a:lnSpc>
+                </a:pPr>
+                <a:r>
+                  <a:rPr lang="en-GB" sz="1250" b="0" strike="noStrike" spc="-1" dirty="0">
+                    <a:solidFill>
+                      <a:srgbClr val="FFFFFF"/>
+                    </a:solidFill>
+                    <a:latin typeface="Source Sans Pro"/>
+                  </a:rPr>
+                  <a:t>2</a:t>
+                </a:r>
+                <a:endParaRPr lang="en-GB" sz="1250" b="0" strike="noStrike" spc="-1" dirty="0">
+                  <a:latin typeface="Arial"/>
+                </a:endParaRPr>
+              </a:p>
+            </p:txBody>
+          </p:sp>
+          <p:sp>
+            <p:nvSpPr>
+              <p:cNvPr id="48" name="CustomShape 9"/>
+              <p:cNvSpPr/>
+              <p:nvPr/>
+            </p:nvSpPr>
+            <p:spPr>
+              <a:xfrm rot="5400000">
+                <a:off x="4887851" y="2250949"/>
+                <a:ext cx="634778" cy="338760"/>
+              </a:xfrm>
+              <a:prstGeom prst="rightArrow">
+                <a:avLst>
+                  <a:gd name="adj1" fmla="val 100000"/>
+                  <a:gd name="adj2" fmla="val 41015"/>
+                </a:avLst>
+              </a:prstGeom>
+              <a:solidFill>
+                <a:srgbClr val="EE502E"/>
+              </a:solidFill>
+              <a:ln>
+                <a:noFill/>
+              </a:ln>
+            </p:spPr>
+            <p:style>
+              <a:lnRef idx="0">
+                <a:scrgbClr r="0" g="0" b="0"/>
+              </a:lnRef>
+              <a:fillRef idx="0">
+                <a:scrgbClr r="0" g="0" b="0"/>
+              </a:fillRef>
+              <a:effectRef idx="0">
+                <a:scrgbClr r="0" g="0" b="0"/>
+              </a:effectRef>
+              <a:fontRef idx="minor"/>
+            </p:style>
+          </p:sp>
+          <p:sp>
+            <p:nvSpPr>
+              <p:cNvPr id="49" name="CustomShape 10"/>
+              <p:cNvSpPr/>
+              <p:nvPr/>
+            </p:nvSpPr>
+            <p:spPr>
+              <a:xfrm rot="5400000">
+                <a:off x="9273086" y="2535482"/>
+                <a:ext cx="960392" cy="826650"/>
+              </a:xfrm>
+              <a:prstGeom prst="rightArrow">
+                <a:avLst>
+                  <a:gd name="adj1" fmla="val 100000"/>
+                  <a:gd name="adj2" fmla="val 41015"/>
+                </a:avLst>
+              </a:prstGeom>
+              <a:solidFill>
+                <a:srgbClr val="EE502E"/>
+              </a:solidFill>
+              <a:ln>
+                <a:noFill/>
+              </a:ln>
+            </p:spPr>
+            <p:style>
+              <a:lnRef idx="0">
+                <a:scrgbClr r="0" g="0" b="0"/>
+              </a:lnRef>
+              <a:fillRef idx="0">
+                <a:scrgbClr r="0" g="0" b="0"/>
+              </a:fillRef>
+              <a:effectRef idx="0">
+                <a:scrgbClr r="0" g="0" b="0"/>
+              </a:effectRef>
+              <a:fontRef idx="minor"/>
+            </p:style>
+            <p:txBody>
+              <a:bodyPr vert="vert270"/>
+              <a:lstStyle/>
+              <a:p>
+                <a:pPr algn="ctr"/>
+                <a:r>
+                  <a:rPr lang="en-GB" sz="1100" dirty="0">
+                    <a:solidFill>
+                      <a:schemeClr val="bg1"/>
+                    </a:solidFill>
+                    <a:latin typeface="Source Sans Pro" panose="020B0503030403020204" pitchFamily="34" charset="0"/>
+                    <a:ea typeface="Source Sans Pro" panose="020B0503030403020204" pitchFamily="34" charset="0"/>
+                  </a:rPr>
+                  <a:t>Button Pressed Interrupt</a:t>
+                </a:r>
+              </a:p>
+              <a:p>
+                <a:pPr algn="ctr"/>
+                <a:r>
+                  <a:rPr lang="en-GB" sz="1100" dirty="0">
+                    <a:solidFill>
+                      <a:schemeClr val="bg1"/>
+                    </a:solidFill>
+                    <a:latin typeface="Source Sans Pro" panose="020B0503030403020204" pitchFamily="34" charset="0"/>
+                    <a:ea typeface="Source Sans Pro" panose="020B0503030403020204" pitchFamily="34" charset="0"/>
+                  </a:rPr>
+                  <a:t>Handler</a:t>
+                </a:r>
+              </a:p>
+            </p:txBody>
+          </p:sp>
+          <p:sp>
+            <p:nvSpPr>
+              <p:cNvPr id="50" name="Line 11"/>
+              <p:cNvSpPr/>
+              <p:nvPr/>
+            </p:nvSpPr>
+            <p:spPr>
+              <a:xfrm>
+                <a:off x="3771900" y="2103480"/>
+                <a:ext cx="1263780" cy="0"/>
+              </a:xfrm>
+              <a:prstGeom prst="line">
+                <a:avLst/>
+              </a:prstGeom>
+              <a:ln w="28440">
+                <a:solidFill>
+                  <a:srgbClr val="A9B1B5"/>
+                </a:solidFill>
+                <a:round/>
+                <a:tailEnd type="triangle" w="med" len="med"/>
+              </a:ln>
+            </p:spPr>
+            <p:style>
+              <a:lnRef idx="0">
+                <a:scrgbClr r="0" g="0" b="0"/>
+              </a:lnRef>
+              <a:fillRef idx="0">
+                <a:scrgbClr r="0" g="0" b="0"/>
+              </a:fillRef>
+              <a:effectRef idx="0">
+                <a:scrgbClr r="0" g="0" b="0"/>
+              </a:effectRef>
+              <a:fontRef idx="minor"/>
+            </p:style>
+          </p:sp>
+          <p:sp>
+            <p:nvSpPr>
+              <p:cNvPr id="51" name="Line 12"/>
+              <p:cNvSpPr/>
+              <p:nvPr/>
+            </p:nvSpPr>
+            <p:spPr>
+              <a:xfrm flipH="1">
+                <a:off x="4028727" y="2759505"/>
+                <a:ext cx="1176512" cy="0"/>
+              </a:xfrm>
+              <a:prstGeom prst="line">
+                <a:avLst/>
+              </a:prstGeom>
+              <a:ln w="28440">
+                <a:solidFill>
+                  <a:srgbClr val="A9B1B5"/>
+                </a:solidFill>
+                <a:round/>
+                <a:tailEnd type="triangle" w="med" len="med"/>
+              </a:ln>
+            </p:spPr>
+            <p:style>
+              <a:lnRef idx="0">
+                <a:scrgbClr r="0" g="0" b="0"/>
+              </a:lnRef>
+              <a:fillRef idx="0">
+                <a:scrgbClr r="0" g="0" b="0"/>
+              </a:fillRef>
+              <a:effectRef idx="0">
+                <a:scrgbClr r="0" g="0" b="0"/>
+              </a:effectRef>
+              <a:fontRef idx="minor"/>
+            </p:style>
+          </p:sp>
+          <p:sp>
+            <p:nvSpPr>
+              <p:cNvPr id="52" name="Line 13"/>
+              <p:cNvSpPr/>
+              <p:nvPr/>
+            </p:nvSpPr>
+            <p:spPr>
+              <a:xfrm flipH="1">
+                <a:off x="4044580" y="3458812"/>
+                <a:ext cx="5708701" cy="0"/>
+              </a:xfrm>
+              <a:prstGeom prst="line">
+                <a:avLst/>
+              </a:prstGeom>
+              <a:ln w="28440">
+                <a:solidFill>
+                  <a:srgbClr val="A9B1B5"/>
+                </a:solidFill>
+                <a:round/>
+                <a:tailEnd type="triangle" w="med" len="med"/>
+              </a:ln>
+            </p:spPr>
+            <p:style>
+              <a:lnRef idx="0">
+                <a:scrgbClr r="0" g="0" b="0"/>
+              </a:lnRef>
+              <a:fillRef idx="0">
+                <a:scrgbClr r="0" g="0" b="0"/>
+              </a:fillRef>
+              <a:effectRef idx="0">
+                <a:scrgbClr r="0" g="0" b="0"/>
+              </a:effectRef>
+              <a:fontRef idx="minor"/>
+            </p:style>
+          </p:sp>
+          <p:sp>
+            <p:nvSpPr>
+              <p:cNvPr id="53" name="CustomShape 14"/>
+              <p:cNvSpPr/>
+              <p:nvPr/>
+            </p:nvSpPr>
+            <p:spPr>
+              <a:xfrm>
+                <a:off x="3260880" y="4819383"/>
+                <a:ext cx="1929240" cy="460211"/>
+              </a:xfrm>
+              <a:prstGeom prst="rect">
+                <a:avLst/>
+              </a:prstGeom>
+              <a:noFill/>
+              <a:ln>
+                <a:noFill/>
+              </a:ln>
+            </p:spPr>
+            <p:style>
+              <a:lnRef idx="0">
+                <a:scrgbClr r="0" g="0" b="0"/>
+              </a:lnRef>
+              <a:fillRef idx="0">
+                <a:scrgbClr r="0" g="0" b="0"/>
+              </a:fillRef>
+              <a:effectRef idx="0">
+                <a:scrgbClr r="0" g="0" b="0"/>
+              </a:effectRef>
+              <a:fontRef idx="minor"/>
+            </p:style>
+            <p:txBody>
+              <a:bodyPr lIns="108000" tIns="45000" rIns="108000" bIns="45000">
+                <a:spAutoFit/>
+              </a:bodyPr>
+              <a:lstStyle/>
+              <a:p>
+                <a:pPr algn="ctr">
+                  <a:lnSpc>
+                    <a:spcPct val="100000"/>
+                  </a:lnSpc>
+                </a:pPr>
+                <a:r>
+                  <a:rPr lang="en-GB" sz="1200" b="1" strike="noStrike" spc="-1" dirty="0">
+                    <a:solidFill>
+                      <a:srgbClr val="4B5357"/>
+                    </a:solidFill>
+                    <a:latin typeface="Source Sans Pro Light"/>
+                    <a:ea typeface="Source Sans Pro Light"/>
+                  </a:rPr>
+                  <a:t>The </a:t>
+                </a:r>
+                <a:r>
+                  <a:rPr lang="en-GB" sz="1200" b="1" strike="noStrike" spc="-1" dirty="0" err="1">
+                    <a:solidFill>
+                      <a:srgbClr val="4B5357"/>
+                    </a:solidFill>
+                    <a:latin typeface="Source Sans Pro Light"/>
+                    <a:ea typeface="Source Sans Pro Light"/>
+                  </a:rPr>
+                  <a:t>MicroEJ</a:t>
+                </a:r>
+                <a:r>
+                  <a:rPr lang="en-GB" sz="1200" b="1" strike="noStrike" spc="-1" dirty="0">
+                    <a:solidFill>
+                      <a:srgbClr val="4B5357"/>
+                    </a:solidFill>
+                    <a:latin typeface="Source Sans Pro Light"/>
+                    <a:ea typeface="Source Sans Pro Light"/>
+                  </a:rPr>
+                  <a:t> VEE </a:t>
+                </a:r>
+                <a:endParaRPr lang="en-GB" sz="1200" b="0" strike="noStrike" spc="-1" dirty="0">
+                  <a:latin typeface="Arial"/>
+                </a:endParaRPr>
+              </a:p>
+              <a:p>
+                <a:pPr algn="ctr">
+                  <a:lnSpc>
+                    <a:spcPct val="100000"/>
+                  </a:lnSpc>
+                </a:pPr>
+                <a:r>
+                  <a:rPr lang="en-GB" sz="1200" b="1" strike="noStrike" spc="-1" dirty="0">
+                    <a:solidFill>
+                      <a:srgbClr val="4B5357"/>
+                    </a:solidFill>
+                    <a:latin typeface="Source Sans Pro Light"/>
+                    <a:ea typeface="Source Sans Pro Light"/>
+                  </a:rPr>
+                  <a:t>RTOS task</a:t>
+                </a:r>
+                <a:endParaRPr lang="en-GB" sz="1200" b="0" strike="noStrike" spc="-1" dirty="0">
+                  <a:latin typeface="Arial"/>
+                </a:endParaRPr>
+              </a:p>
+            </p:txBody>
+          </p:sp>
+          <p:sp>
+            <p:nvSpPr>
+              <p:cNvPr id="54" name="CustomShape 15"/>
+              <p:cNvSpPr/>
+              <p:nvPr/>
+            </p:nvSpPr>
+            <p:spPr>
+              <a:xfrm>
+                <a:off x="9253085" y="4814572"/>
+                <a:ext cx="1006605" cy="460211"/>
+              </a:xfrm>
+              <a:prstGeom prst="rect">
+                <a:avLst/>
+              </a:prstGeom>
+              <a:noFill/>
+              <a:ln>
+                <a:noFill/>
+              </a:ln>
+            </p:spPr>
+            <p:style>
+              <a:lnRef idx="0">
+                <a:scrgbClr r="0" g="0" b="0"/>
+              </a:lnRef>
+              <a:fillRef idx="0">
+                <a:scrgbClr r="0" g="0" b="0"/>
+              </a:fillRef>
+              <a:effectRef idx="0">
+                <a:scrgbClr r="0" g="0" b="0"/>
+              </a:effectRef>
+              <a:fontRef idx="minor"/>
+            </p:style>
+            <p:txBody>
+              <a:bodyPr wrap="square" lIns="108000" tIns="45000" rIns="108000" bIns="45000">
+                <a:spAutoFit/>
+              </a:bodyPr>
+              <a:lstStyle/>
+              <a:p>
+                <a:pPr algn="ctr">
+                  <a:lnSpc>
+                    <a:spcPct val="100000"/>
+                  </a:lnSpc>
+                </a:pPr>
+                <a:r>
+                  <a:rPr lang="en-GB" sz="1200" b="1" strike="noStrike" spc="-1" dirty="0">
+                    <a:solidFill>
+                      <a:srgbClr val="4B5357"/>
+                    </a:solidFill>
+                    <a:latin typeface="Source Sans Pro Light"/>
+                    <a:ea typeface="Source Sans Pro Light"/>
+                  </a:rPr>
+                  <a:t>The button IRQ</a:t>
+                </a:r>
+                <a:endParaRPr lang="en-GB" sz="1200" b="0" strike="noStrike" spc="-1" dirty="0">
+                  <a:latin typeface="Arial"/>
+                </a:endParaRPr>
+              </a:p>
+            </p:txBody>
+          </p:sp>
+          <p:sp>
+            <p:nvSpPr>
+              <p:cNvPr id="55" name="CustomShape 16"/>
+              <p:cNvSpPr/>
+              <p:nvPr/>
+            </p:nvSpPr>
+            <p:spPr>
+              <a:xfrm>
+                <a:off x="5615280" y="2144137"/>
+                <a:ext cx="2621880" cy="250200"/>
+              </a:xfrm>
+              <a:prstGeom prst="rect">
+                <a:avLst/>
+              </a:prstGeom>
+              <a:noFill/>
+              <a:ln>
+                <a:noFill/>
+              </a:ln>
+            </p:spPr>
+            <p:style>
+              <a:lnRef idx="0">
+                <a:scrgbClr r="0" g="0" b="0"/>
+              </a:lnRef>
+              <a:fillRef idx="0">
+                <a:scrgbClr r="0" g="0" b="0"/>
+              </a:fillRef>
+              <a:effectRef idx="0">
+                <a:scrgbClr r="0" g="0" b="0"/>
+              </a:effectRef>
+              <a:fontRef idx="minor"/>
+            </p:style>
+            <p:txBody>
+              <a:bodyPr lIns="108000" tIns="45000" rIns="108000" bIns="45000">
+                <a:spAutoFit/>
+              </a:bodyPr>
+              <a:lstStyle/>
+              <a:p>
+                <a:pPr>
+                  <a:lnSpc>
+                    <a:spcPct val="100000"/>
+                  </a:lnSpc>
+                </a:pPr>
+                <a:r>
+                  <a:rPr lang="en-GB" sz="1050" b="0" strike="noStrike" spc="-1" dirty="0" err="1">
+                    <a:solidFill>
+                      <a:srgbClr val="4B5357"/>
+                    </a:solidFill>
+                    <a:latin typeface="Consolas"/>
+                    <a:ea typeface="Source Sans Pro Light"/>
+                  </a:rPr>
+                  <a:t>SNI_getCurrentJavaThreadID</a:t>
+                </a:r>
+                <a:r>
+                  <a:rPr lang="en-GB" sz="1050" b="0" strike="noStrike" spc="-1" dirty="0">
+                    <a:solidFill>
+                      <a:srgbClr val="4B5357"/>
+                    </a:solidFill>
+                    <a:latin typeface="Consolas"/>
+                    <a:ea typeface="Source Sans Pro Light"/>
+                  </a:rPr>
+                  <a:t>() : </a:t>
+                </a:r>
+                <a:r>
+                  <a:rPr lang="en-GB" sz="1050" spc="-1" dirty="0">
+                    <a:solidFill>
+                      <a:srgbClr val="4B5357"/>
+                    </a:solidFill>
+                    <a:latin typeface="Consolas"/>
+                    <a:ea typeface="Source Sans Pro Light"/>
+                  </a:rPr>
+                  <a:t>2</a:t>
+                </a:r>
+                <a:endParaRPr lang="en-GB" sz="1050" b="0" strike="noStrike" spc="-1" dirty="0">
+                  <a:latin typeface="Arial"/>
+                </a:endParaRPr>
+              </a:p>
+            </p:txBody>
+          </p:sp>
+          <p:sp>
+            <p:nvSpPr>
+              <p:cNvPr id="56" name="CustomShape 17"/>
+              <p:cNvSpPr/>
+              <p:nvPr/>
+            </p:nvSpPr>
+            <p:spPr>
+              <a:xfrm>
+                <a:off x="5615280" y="2426971"/>
+                <a:ext cx="3125700" cy="252462"/>
+              </a:xfrm>
+              <a:prstGeom prst="rect">
+                <a:avLst/>
+              </a:prstGeom>
+              <a:noFill/>
+              <a:ln>
+                <a:noFill/>
+              </a:ln>
+            </p:spPr>
+            <p:style>
+              <a:lnRef idx="0">
+                <a:scrgbClr r="0" g="0" b="0"/>
+              </a:lnRef>
+              <a:fillRef idx="0">
+                <a:scrgbClr r="0" g="0" b="0"/>
+              </a:fillRef>
+              <a:effectRef idx="0">
+                <a:scrgbClr r="0" g="0" b="0"/>
+              </a:effectRef>
+              <a:fontRef idx="minor"/>
+            </p:style>
+            <p:txBody>
+              <a:bodyPr wrap="square" lIns="108000" tIns="45000" rIns="108000" bIns="45000">
+                <a:spAutoFit/>
+              </a:bodyPr>
+              <a:lstStyle/>
+              <a:p>
+                <a:pPr>
+                  <a:lnSpc>
+                    <a:spcPct val="100000"/>
+                  </a:lnSpc>
+                </a:pPr>
+                <a:r>
+                  <a:rPr lang="en-GB" sz="1050" b="0" strike="noStrike" spc="-1" dirty="0" err="1">
+                    <a:solidFill>
+                      <a:srgbClr val="4B5357"/>
+                    </a:solidFill>
+                    <a:latin typeface="Consolas"/>
+                    <a:ea typeface="Source Sans Pro Light"/>
+                  </a:rPr>
+                  <a:t>SNI_suspendCurrentJavaThread</a:t>
+                </a:r>
+                <a:r>
+                  <a:rPr lang="en-GB" sz="1050" b="0" strike="noStrike" spc="-1" dirty="0">
+                    <a:solidFill>
+                      <a:srgbClr val="4B5357"/>
+                    </a:solidFill>
+                    <a:latin typeface="Consolas"/>
+                    <a:ea typeface="Source Sans Pro Light"/>
+                  </a:rPr>
+                  <a:t>(</a:t>
+                </a:r>
+                <a:r>
+                  <a:rPr lang="en-GB" sz="1050" b="0" strike="noStrike" spc="-1" dirty="0" err="1">
+                    <a:solidFill>
+                      <a:srgbClr val="4B5357"/>
+                    </a:solidFill>
+                    <a:latin typeface="Consolas"/>
+                    <a:ea typeface="Source Sans Pro Light"/>
+                  </a:rPr>
+                  <a:t>callback</a:t>
+                </a:r>
+                <a:r>
+                  <a:rPr lang="en-GB" sz="1050" b="0" strike="noStrike" spc="-1" dirty="0">
+                    <a:solidFill>
+                      <a:srgbClr val="4B5357"/>
+                    </a:solidFill>
+                    <a:latin typeface="Consolas"/>
+                    <a:ea typeface="Source Sans Pro Light"/>
+                  </a:rPr>
+                  <a:t>)</a:t>
+                </a:r>
+                <a:endParaRPr lang="en-GB" sz="1050" b="0" strike="noStrike" spc="-1" dirty="0">
+                  <a:latin typeface="Arial"/>
+                </a:endParaRPr>
+              </a:p>
+            </p:txBody>
+          </p:sp>
+          <p:sp>
+            <p:nvSpPr>
+              <p:cNvPr id="57" name="CustomShape 18"/>
+              <p:cNvSpPr/>
+              <p:nvPr/>
+            </p:nvSpPr>
+            <p:spPr>
+              <a:xfrm>
+                <a:off x="4028728" y="3461632"/>
+                <a:ext cx="975360" cy="250200"/>
+              </a:xfrm>
+              <a:prstGeom prst="rect">
+                <a:avLst/>
+              </a:prstGeom>
+              <a:noFill/>
+              <a:ln>
+                <a:noFill/>
+              </a:ln>
+            </p:spPr>
+            <p:style>
+              <a:lnRef idx="0">
+                <a:scrgbClr r="0" g="0" b="0"/>
+              </a:lnRef>
+              <a:fillRef idx="0">
+                <a:scrgbClr r="0" g="0" b="0"/>
+              </a:fillRef>
+              <a:effectRef idx="0">
+                <a:scrgbClr r="0" g="0" b="0"/>
+              </a:effectRef>
+              <a:fontRef idx="minor"/>
+            </p:style>
+            <p:txBody>
+              <a:bodyPr wrap="square" lIns="108000" tIns="45000" rIns="108000" bIns="45000">
+                <a:spAutoFit/>
+              </a:bodyPr>
+              <a:lstStyle/>
+              <a:p>
+                <a:pPr algn="ctr">
+                  <a:lnSpc>
+                    <a:spcPct val="100000"/>
+                  </a:lnSpc>
+                </a:pPr>
+                <a:r>
+                  <a:rPr lang="en-GB" sz="1050" b="0" strike="noStrike" spc="-1" dirty="0" err="1">
+                    <a:solidFill>
+                      <a:srgbClr val="4B5357"/>
+                    </a:solidFill>
+                    <a:latin typeface="Consolas"/>
+                    <a:ea typeface="Source Sans Pro Light"/>
+                  </a:rPr>
+                  <a:t>callback</a:t>
+                </a:r>
+                <a:r>
+                  <a:rPr lang="en-GB" sz="1050" b="0" strike="noStrike" spc="-1" dirty="0">
+                    <a:solidFill>
+                      <a:srgbClr val="4B5357"/>
+                    </a:solidFill>
+                    <a:latin typeface="Consolas"/>
+                    <a:ea typeface="Source Sans Pro Light"/>
+                  </a:rPr>
+                  <a:t>()</a:t>
+                </a:r>
+                <a:endParaRPr lang="en-GB" sz="1050" b="0" strike="noStrike" spc="-1" dirty="0">
+                  <a:latin typeface="Arial"/>
+                </a:endParaRPr>
+              </a:p>
+            </p:txBody>
+          </p:sp>
+          <p:sp>
+            <p:nvSpPr>
+              <p:cNvPr id="59" name="Line 20"/>
+              <p:cNvSpPr/>
+              <p:nvPr/>
+            </p:nvSpPr>
+            <p:spPr>
+              <a:xfrm flipH="1">
+                <a:off x="5205240" y="2555745"/>
+                <a:ext cx="428400" cy="360"/>
+              </a:xfrm>
+              <a:prstGeom prst="line">
+                <a:avLst/>
+              </a:prstGeom>
+              <a:ln w="28440">
+                <a:solidFill>
+                  <a:srgbClr val="A9B1B5"/>
+                </a:solidFill>
+                <a:round/>
+                <a:tailEnd type="oval" w="med" len="med"/>
+              </a:ln>
+            </p:spPr>
+            <p:style>
+              <a:lnRef idx="0">
+                <a:scrgbClr r="0" g="0" b="0"/>
+              </a:lnRef>
+              <a:fillRef idx="0">
+                <a:scrgbClr r="0" g="0" b="0"/>
+              </a:fillRef>
+              <a:effectRef idx="0">
+                <a:scrgbClr r="0" g="0" b="0"/>
+              </a:effectRef>
+              <a:fontRef idx="minor"/>
+            </p:style>
+          </p:sp>
+          <p:sp>
+            <p:nvSpPr>
+              <p:cNvPr id="60" name="Line 21"/>
+              <p:cNvSpPr/>
+              <p:nvPr/>
+            </p:nvSpPr>
+            <p:spPr>
+              <a:xfrm flipH="1">
+                <a:off x="5209200" y="2283120"/>
+                <a:ext cx="428400" cy="360"/>
+              </a:xfrm>
+              <a:prstGeom prst="line">
+                <a:avLst/>
+              </a:prstGeom>
+              <a:ln w="28440">
+                <a:solidFill>
+                  <a:srgbClr val="A9B1B5"/>
+                </a:solidFill>
+                <a:round/>
+                <a:tailEnd type="oval" w="med" len="med"/>
+              </a:ln>
+            </p:spPr>
+            <p:style>
+              <a:lnRef idx="0">
+                <a:scrgbClr r="0" g="0" b="0"/>
+              </a:lnRef>
+              <a:fillRef idx="0">
+                <a:scrgbClr r="0" g="0" b="0"/>
+              </a:fillRef>
+              <a:effectRef idx="0">
+                <a:scrgbClr r="0" g="0" b="0"/>
+              </a:effectRef>
+              <a:fontRef idx="minor"/>
+            </p:style>
+          </p:sp>
+          <p:sp>
+            <p:nvSpPr>
+              <p:cNvPr id="61" name="CustomShape 22"/>
+              <p:cNvSpPr/>
+              <p:nvPr/>
+            </p:nvSpPr>
+            <p:spPr>
+              <a:xfrm rot="5400000">
+                <a:off x="8751690" y="2663526"/>
+                <a:ext cx="3871219" cy="189033"/>
+              </a:xfrm>
+              <a:prstGeom prst="rightArrow">
+                <a:avLst>
+                  <a:gd name="adj1" fmla="val 100000"/>
+                  <a:gd name="adj2" fmla="val 50000"/>
+                </a:avLst>
+              </a:prstGeom>
+              <a:solidFill>
+                <a:srgbClr val="717D83"/>
+              </a:solidFill>
+              <a:ln>
+                <a:noFill/>
+              </a:ln>
+            </p:spPr>
+            <p:style>
+              <a:lnRef idx="0">
+                <a:scrgbClr r="0" g="0" b="0"/>
+              </a:lnRef>
+              <a:fillRef idx="0">
+                <a:scrgbClr r="0" g="0" b="0"/>
+              </a:fillRef>
+              <a:effectRef idx="0">
+                <a:scrgbClr r="0" g="0" b="0"/>
+              </a:effectRef>
+              <a:fontRef idx="minor"/>
+            </p:style>
+            <p:txBody>
+              <a:bodyPr lIns="90000" tIns="45000" rIns="90000" bIns="45000" anchor="ctr">
+                <a:noAutofit/>
+              </a:bodyPr>
+              <a:lstStyle/>
+              <a:p>
+                <a:pPr algn="ctr">
+                  <a:lnSpc>
+                    <a:spcPct val="100000"/>
+                  </a:lnSpc>
+                </a:pPr>
+                <a:r>
+                  <a:rPr lang="en-GB" sz="1050" b="0" strike="noStrike" spc="-1">
+                    <a:solidFill>
+                      <a:srgbClr val="FFFFFF"/>
+                    </a:solidFill>
+                    <a:latin typeface="Source Sans Pro"/>
+                  </a:rPr>
+                  <a:t>Time</a:t>
+                </a:r>
+                <a:endParaRPr lang="en-GB" sz="1050" b="0" strike="noStrike" spc="-1">
+                  <a:latin typeface="Arial"/>
+                </a:endParaRPr>
+              </a:p>
+            </p:txBody>
+          </p:sp>
+          <p:sp>
+            <p:nvSpPr>
+              <p:cNvPr id="24" name="CustomShape 16">
+                <a:extLst>
+                  <a:ext uri="{FF2B5EF4-FFF2-40B4-BE49-F238E27FC236}">
+                    <a16:creationId xmlns:a16="http://schemas.microsoft.com/office/drawing/2014/main" id="{490B7A99-716D-4CB1-9D08-0D73792CB0C0}"/>
+                  </a:ext>
+                </a:extLst>
+              </p:cNvPr>
+              <p:cNvSpPr/>
+              <p:nvPr/>
+            </p:nvSpPr>
+            <p:spPr>
+              <a:xfrm>
+                <a:off x="3935771" y="1844358"/>
+                <a:ext cx="1138594" cy="252462"/>
+              </a:xfrm>
+              <a:prstGeom prst="rect">
+                <a:avLst/>
+              </a:prstGeom>
+              <a:noFill/>
+              <a:ln>
+                <a:noFill/>
+              </a:ln>
+            </p:spPr>
+            <p:style>
+              <a:lnRef idx="0">
+                <a:scrgbClr r="0" g="0" b="0"/>
+              </a:lnRef>
+              <a:fillRef idx="0">
+                <a:scrgbClr r="0" g="0" b="0"/>
+              </a:fillRef>
+              <a:effectRef idx="0">
+                <a:scrgbClr r="0" g="0" b="0"/>
+              </a:effectRef>
+              <a:fontRef idx="minor"/>
+            </p:style>
+            <p:txBody>
+              <a:bodyPr wrap="square" lIns="108000" tIns="45000" rIns="108000" bIns="45000">
+                <a:spAutoFit/>
+              </a:bodyPr>
+              <a:lstStyle/>
+              <a:p>
+                <a:pPr algn="ctr">
+                  <a:lnSpc>
+                    <a:spcPct val="100000"/>
+                  </a:lnSpc>
+                </a:pPr>
+                <a:r>
+                  <a:rPr lang="en-GB" sz="1050" b="0" strike="noStrike" spc="-1" dirty="0" err="1">
+                    <a:solidFill>
+                      <a:srgbClr val="4B5357"/>
+                    </a:solidFill>
+                    <a:latin typeface="Consolas"/>
+                    <a:ea typeface="Source Sans Pro Light"/>
+                  </a:rPr>
+                  <a:t>waitButton</a:t>
+                </a:r>
+                <a:r>
+                  <a:rPr lang="en-GB" sz="1050" b="0" strike="noStrike" spc="-1" dirty="0">
+                    <a:solidFill>
+                      <a:srgbClr val="4B5357"/>
+                    </a:solidFill>
+                    <a:latin typeface="Consolas"/>
+                    <a:ea typeface="Source Sans Pro Light"/>
+                  </a:rPr>
+                  <a:t>()</a:t>
+                </a:r>
+                <a:endParaRPr lang="en-GB" sz="1050" b="0" strike="noStrike" spc="-1" dirty="0">
+                  <a:latin typeface="Arial"/>
+                </a:endParaRPr>
+              </a:p>
+            </p:txBody>
+          </p:sp>
+          <p:sp>
+            <p:nvSpPr>
+              <p:cNvPr id="25" name="CustomShape 17">
+                <a:extLst>
+                  <a:ext uri="{FF2B5EF4-FFF2-40B4-BE49-F238E27FC236}">
+                    <a16:creationId xmlns:a16="http://schemas.microsoft.com/office/drawing/2014/main" id="{0829D57E-25C5-4404-BBC8-0D2F7B84B1D8}"/>
+                  </a:ext>
+                </a:extLst>
+              </p:cNvPr>
+              <p:cNvSpPr/>
+              <p:nvPr/>
+            </p:nvSpPr>
+            <p:spPr>
+              <a:xfrm>
+                <a:off x="5633640" y="3206350"/>
+                <a:ext cx="3741269" cy="252462"/>
+              </a:xfrm>
+              <a:prstGeom prst="rect">
+                <a:avLst/>
+              </a:prstGeom>
+              <a:noFill/>
+              <a:ln>
+                <a:noFill/>
+              </a:ln>
+            </p:spPr>
+            <p:style>
+              <a:lnRef idx="0">
+                <a:scrgbClr r="0" g="0" b="0"/>
+              </a:lnRef>
+              <a:fillRef idx="0">
+                <a:scrgbClr r="0" g="0" b="0"/>
+              </a:fillRef>
+              <a:effectRef idx="0">
+                <a:scrgbClr r="0" g="0" b="0"/>
+              </a:effectRef>
+              <a:fontRef idx="minor"/>
+            </p:style>
+            <p:txBody>
+              <a:bodyPr wrap="square" lIns="108000" tIns="45000" rIns="108000" bIns="45000">
+                <a:spAutoFit/>
+              </a:bodyPr>
+              <a:lstStyle/>
+              <a:p>
+                <a:pPr>
+                  <a:lnSpc>
+                    <a:spcPct val="100000"/>
+                  </a:lnSpc>
+                </a:pPr>
+                <a:r>
+                  <a:rPr lang="en-US" sz="1050" b="0" strike="noStrike" spc="-1" dirty="0" err="1">
+                    <a:solidFill>
+                      <a:srgbClr val="4B5357"/>
+                    </a:solidFill>
+                    <a:latin typeface="Consolas"/>
+                    <a:ea typeface="Source Sans Pro Light"/>
+                  </a:rPr>
+                  <a:t>SNI_resumeJavaThreadWithArg</a:t>
+                </a:r>
+                <a:r>
+                  <a:rPr lang="en-US" sz="1050" b="0" strike="noStrike" spc="-1" dirty="0">
+                    <a:solidFill>
+                      <a:srgbClr val="4B5357"/>
+                    </a:solidFill>
+                    <a:latin typeface="Consolas"/>
+                    <a:ea typeface="Source Sans Pro Light"/>
+                  </a:rPr>
+                  <a:t>(2, </a:t>
+                </a:r>
+                <a:r>
+                  <a:rPr lang="en-US" sz="1050" b="0" strike="noStrike" spc="-1" dirty="0" err="1">
+                    <a:solidFill>
+                      <a:srgbClr val="4B5357"/>
+                    </a:solidFill>
+                    <a:latin typeface="Consolas"/>
+                    <a:ea typeface="Source Sans Pro Light"/>
+                  </a:rPr>
+                  <a:t>button_index</a:t>
+                </a:r>
+                <a:r>
+                  <a:rPr lang="en-US" sz="1050" b="0" strike="noStrike" spc="-1" dirty="0">
+                    <a:solidFill>
+                      <a:srgbClr val="4B5357"/>
+                    </a:solidFill>
+                    <a:latin typeface="Consolas"/>
+                    <a:ea typeface="Source Sans Pro Light"/>
+                  </a:rPr>
+                  <a:t>)</a:t>
+                </a:r>
+                <a:endParaRPr lang="en-GB" sz="1050" b="0" strike="noStrike" spc="-1" dirty="0">
+                  <a:solidFill>
+                    <a:srgbClr val="4B5357"/>
+                  </a:solidFill>
+                  <a:latin typeface="Consolas"/>
+                  <a:ea typeface="Source Sans Pro Light"/>
+                </a:endParaRPr>
+              </a:p>
+            </p:txBody>
+          </p:sp>
+          <p:sp>
+            <p:nvSpPr>
+              <p:cNvPr id="26" name="Line 12">
+                <a:extLst>
+                  <a:ext uri="{FF2B5EF4-FFF2-40B4-BE49-F238E27FC236}">
+                    <a16:creationId xmlns:a16="http://schemas.microsoft.com/office/drawing/2014/main" id="{7FBF7DE5-71AA-4C66-AF0B-87F6CCD3A91B}"/>
+                  </a:ext>
+                </a:extLst>
+              </p:cNvPr>
+              <p:cNvSpPr/>
+              <p:nvPr/>
+            </p:nvSpPr>
+            <p:spPr>
+              <a:xfrm>
+                <a:off x="4044583" y="3720772"/>
+                <a:ext cx="991097" cy="0"/>
+              </a:xfrm>
+              <a:prstGeom prst="line">
+                <a:avLst/>
+              </a:prstGeom>
+              <a:ln w="28440">
+                <a:solidFill>
+                  <a:srgbClr val="A9B1B5"/>
+                </a:solidFill>
+                <a:round/>
+                <a:tailEnd type="triangle" w="med" len="med"/>
+              </a:ln>
+            </p:spPr>
+            <p:style>
+              <a:lnRef idx="0">
+                <a:scrgbClr r="0" g="0" b="0"/>
+              </a:lnRef>
+              <a:fillRef idx="0">
+                <a:scrgbClr r="0" g="0" b="0"/>
+              </a:fillRef>
+              <a:effectRef idx="0">
+                <a:scrgbClr r="0" g="0" b="0"/>
+              </a:effectRef>
+              <a:fontRef idx="minor"/>
+            </p:style>
+          </p:sp>
+          <p:sp>
+            <p:nvSpPr>
+              <p:cNvPr id="27" name="CustomShape 9">
+                <a:extLst>
+                  <a:ext uri="{FF2B5EF4-FFF2-40B4-BE49-F238E27FC236}">
+                    <a16:creationId xmlns:a16="http://schemas.microsoft.com/office/drawing/2014/main" id="{BA7D2D2E-1F8D-473B-B813-8C0DC97545C3}"/>
+                  </a:ext>
+                </a:extLst>
+              </p:cNvPr>
+              <p:cNvSpPr/>
+              <p:nvPr/>
+            </p:nvSpPr>
+            <p:spPr>
+              <a:xfrm rot="5400000">
+                <a:off x="4977234" y="3780742"/>
+                <a:ext cx="456363" cy="338760"/>
+              </a:xfrm>
+              <a:prstGeom prst="rightArrow">
+                <a:avLst>
+                  <a:gd name="adj1" fmla="val 100000"/>
+                  <a:gd name="adj2" fmla="val 41015"/>
+                </a:avLst>
+              </a:prstGeom>
+              <a:solidFill>
+                <a:srgbClr val="EE502E"/>
+              </a:solidFill>
+              <a:ln>
+                <a:noFill/>
+              </a:ln>
+            </p:spPr>
+            <p:style>
+              <a:lnRef idx="0">
+                <a:scrgbClr r="0" g="0" b="0"/>
+              </a:lnRef>
+              <a:fillRef idx="0">
+                <a:scrgbClr r="0" g="0" b="0"/>
+              </a:fillRef>
+              <a:effectRef idx="0">
+                <a:scrgbClr r="0" g="0" b="0"/>
+              </a:effectRef>
+              <a:fontRef idx="minor"/>
+            </p:style>
+            <p:txBody>
+              <a:bodyPr/>
+              <a:lstStyle/>
+              <a:p>
+                <a:endParaRPr lang="en-US" sz="1200" dirty="0"/>
+              </a:p>
+            </p:txBody>
+          </p:sp>
+          <p:sp>
+            <p:nvSpPr>
+              <p:cNvPr id="28" name="Line 12">
+                <a:extLst>
+                  <a:ext uri="{FF2B5EF4-FFF2-40B4-BE49-F238E27FC236}">
+                    <a16:creationId xmlns:a16="http://schemas.microsoft.com/office/drawing/2014/main" id="{B38506DA-FB22-4B7B-9CAF-3FA140565C2B}"/>
+                  </a:ext>
+                </a:extLst>
+              </p:cNvPr>
+              <p:cNvSpPr/>
+              <p:nvPr/>
+            </p:nvSpPr>
+            <p:spPr>
+              <a:xfrm flipH="1">
+                <a:off x="3934784" y="4195502"/>
+                <a:ext cx="1270456" cy="1"/>
+              </a:xfrm>
+              <a:prstGeom prst="line">
+                <a:avLst/>
+              </a:prstGeom>
+              <a:ln w="28440">
+                <a:solidFill>
+                  <a:srgbClr val="A9B1B5"/>
+                </a:solidFill>
+                <a:round/>
+                <a:tailEnd type="triangle" w="med" len="med"/>
+              </a:ln>
+            </p:spPr>
+            <p:style>
+              <a:lnRef idx="0">
+                <a:scrgbClr r="0" g="0" b="0"/>
+              </a:lnRef>
+              <a:fillRef idx="0">
+                <a:scrgbClr r="0" g="0" b="0"/>
+              </a:fillRef>
+              <a:effectRef idx="0">
+                <a:scrgbClr r="0" g="0" b="0"/>
+              </a:effectRef>
+              <a:fontRef idx="minor"/>
+            </p:style>
+          </p:sp>
+          <p:sp>
+            <p:nvSpPr>
+              <p:cNvPr id="31" name="CustomShape 18">
+                <a:extLst>
+                  <a:ext uri="{FF2B5EF4-FFF2-40B4-BE49-F238E27FC236}">
+                    <a16:creationId xmlns:a16="http://schemas.microsoft.com/office/drawing/2014/main" id="{735B9515-BDB3-4986-9AD7-6B17EA9B42B7}"/>
+                  </a:ext>
+                </a:extLst>
+              </p:cNvPr>
+              <p:cNvSpPr/>
+              <p:nvPr/>
+            </p:nvSpPr>
+            <p:spPr>
+              <a:xfrm>
+                <a:off x="3954954" y="3934099"/>
+                <a:ext cx="1122909" cy="252462"/>
+              </a:xfrm>
+              <a:prstGeom prst="rect">
+                <a:avLst/>
+              </a:prstGeom>
+              <a:noFill/>
+              <a:ln>
+                <a:noFill/>
+              </a:ln>
+            </p:spPr>
+            <p:style>
+              <a:lnRef idx="0">
+                <a:scrgbClr r="0" g="0" b="0"/>
+              </a:lnRef>
+              <a:fillRef idx="0">
+                <a:scrgbClr r="0" g="0" b="0"/>
+              </a:fillRef>
+              <a:effectRef idx="0">
+                <a:scrgbClr r="0" g="0" b="0"/>
+              </a:effectRef>
+              <a:fontRef idx="minor"/>
+            </p:style>
+            <p:txBody>
+              <a:bodyPr wrap="square" lIns="108000" tIns="45000" rIns="108000" bIns="45000">
+                <a:spAutoFit/>
+              </a:bodyPr>
+              <a:lstStyle/>
+              <a:p>
+                <a:pPr algn="ctr">
+                  <a:lnSpc>
+                    <a:spcPct val="100000"/>
+                  </a:lnSpc>
+                </a:pPr>
+                <a:r>
+                  <a:rPr lang="en-GB" sz="1050" b="0" strike="noStrike" spc="-1" dirty="0" err="1">
+                    <a:solidFill>
+                      <a:srgbClr val="4B5357"/>
+                    </a:solidFill>
+                    <a:latin typeface="Consolas"/>
+                    <a:ea typeface="Source Sans Pro Light"/>
+                  </a:rPr>
+                  <a:t>button_index</a:t>
+                </a:r>
+                <a:endParaRPr lang="en-GB" sz="1050" b="0" strike="noStrike" spc="-1" dirty="0">
+                  <a:latin typeface="Arial"/>
+                </a:endParaRPr>
+              </a:p>
+            </p:txBody>
+          </p:sp>
+        </p:grpSp>
         <p:sp>
           <p:nvSpPr>
-            <p:cNvPr id="40" name="CustomShape 1"/>
-            <p:cNvSpPr/>
-            <p:nvPr/>
-          </p:nvSpPr>
-          <p:spPr>
-            <a:xfrm>
-              <a:off x="2914560" y="700920"/>
-              <a:ext cx="2621880" cy="4108484"/>
-            </a:xfrm>
-            <a:prstGeom prst="roundRect">
-              <a:avLst>
-                <a:gd name="adj" fmla="val 5059"/>
-              </a:avLst>
-            </a:prstGeom>
-            <a:solidFill>
-              <a:srgbClr val="F2F2F2"/>
-            </a:solidFill>
-            <a:ln w="19080">
-              <a:noFill/>
-            </a:ln>
-          </p:spPr>
-          <p:style>
-            <a:lnRef idx="0">
-              <a:scrgbClr r="0" g="0" b="0"/>
-            </a:lnRef>
-            <a:fillRef idx="0">
-              <a:scrgbClr r="0" g="0" b="0"/>
-            </a:fillRef>
-            <a:effectRef idx="0">
-              <a:scrgbClr r="0" g="0" b="0"/>
-            </a:effectRef>
-            <a:fontRef idx="minor"/>
-          </p:style>
-        </p:sp>
-        <p:sp>
-          <p:nvSpPr>
-            <p:cNvPr id="41" name="CustomShape 2"/>
-            <p:cNvSpPr/>
-            <p:nvPr/>
-          </p:nvSpPr>
-          <p:spPr>
-            <a:xfrm>
-              <a:off x="9148527" y="706680"/>
-              <a:ext cx="1215720" cy="4102724"/>
-            </a:xfrm>
-            <a:prstGeom prst="roundRect">
-              <a:avLst>
-                <a:gd name="adj" fmla="val 5059"/>
-              </a:avLst>
-            </a:prstGeom>
-            <a:solidFill>
-              <a:schemeClr val="bg1">
-                <a:lumMod val="95000"/>
-              </a:schemeClr>
-            </a:solidFill>
-            <a:ln w="19080">
-              <a:noFill/>
-            </a:ln>
-          </p:spPr>
-          <p:style>
-            <a:lnRef idx="2">
-              <a:schemeClr val="accent1">
-                <a:shade val="50000"/>
-              </a:schemeClr>
-            </a:lnRef>
-            <a:fillRef idx="1">
-              <a:schemeClr val="accent1"/>
-            </a:fillRef>
-            <a:effectRef idx="0">
-              <a:schemeClr val="accent1"/>
-            </a:effectRef>
-            <a:fontRef idx="minor"/>
-          </p:style>
-          <p:txBody>
-            <a:bodyPr/>
-            <a:lstStyle/>
-            <a:p>
-              <a:endParaRPr lang="en-US"/>
-            </a:p>
-          </p:txBody>
-        </p:sp>
-        <p:sp>
-          <p:nvSpPr>
-            <p:cNvPr id="44" name="CustomShape 5"/>
+            <p:cNvPr id="29" name="CustomShape 6">
+              <a:extLst>
+                <a:ext uri="{FF2B5EF4-FFF2-40B4-BE49-F238E27FC236}">
+                  <a16:creationId xmlns:a16="http://schemas.microsoft.com/office/drawing/2014/main" id="{D88EE504-F065-483F-BD53-A7D39AC3C54C}"/>
+                </a:ext>
+              </a:extLst>
+            </p:cNvPr>
             <p:cNvSpPr/>
             <p:nvPr/>
           </p:nvSpPr>
           <p:spPr>
             <a:xfrm rot="5400000">
-              <a:off x="2643463" y="1312560"/>
-              <a:ext cx="1241640" cy="338760"/>
-            </a:xfrm>
-            <a:prstGeom prst="rightArrow">
-              <a:avLst>
-                <a:gd name="adj1" fmla="val 100000"/>
-                <a:gd name="adj2" fmla="val 41015"/>
-              </a:avLst>
-            </a:prstGeom>
-            <a:solidFill>
-              <a:srgbClr val="6CC24A"/>
-            </a:solidFill>
-            <a:ln>
-              <a:noFill/>
-            </a:ln>
-          </p:spPr>
-          <p:style>
-            <a:lnRef idx="0">
-              <a:scrgbClr r="0" g="0" b="0"/>
-            </a:lnRef>
-            <a:fillRef idx="0">
-              <a:scrgbClr r="0" g="0" b="0"/>
-            </a:fillRef>
-            <a:effectRef idx="0">
-              <a:scrgbClr r="0" g="0" b="0"/>
-            </a:effectRef>
-            <a:fontRef idx="minor"/>
-          </p:style>
-          <p:txBody>
-            <a:bodyPr lIns="90000" tIns="45000" rIns="90000" bIns="45000" anchor="ctr">
-              <a:noAutofit/>
-            </a:bodyPr>
-            <a:lstStyle/>
-            <a:p>
-              <a:pPr algn="ctr">
-                <a:lnSpc>
-                  <a:spcPct val="100000"/>
-                </a:lnSpc>
-              </a:pPr>
-              <a:r>
-                <a:rPr lang="en-GB" sz="1100" b="0" strike="noStrike" spc="-1" dirty="0">
-                  <a:solidFill>
-                    <a:srgbClr val="FFFFFF"/>
-                  </a:solidFill>
-                  <a:latin typeface="Source Sans Pro"/>
-                </a:rPr>
-                <a:t>Green thread 1</a:t>
-              </a:r>
-              <a:endParaRPr lang="en-GB" sz="1100" b="0" strike="noStrike" spc="-1" dirty="0">
-                <a:latin typeface="Arial"/>
-              </a:endParaRPr>
-            </a:p>
-          </p:txBody>
-        </p:sp>
-        <p:sp>
-          <p:nvSpPr>
-            <p:cNvPr id="45" name="CustomShape 6"/>
-            <p:cNvSpPr/>
-            <p:nvPr/>
-          </p:nvSpPr>
-          <p:spPr>
-            <a:xfrm rot="5400000">
-              <a:off x="2277867" y="3576542"/>
-              <a:ext cx="1972831" cy="338760"/>
+              <a:off x="2243321" y="4735690"/>
+              <a:ext cx="536836" cy="338760"/>
             </a:xfrm>
             <a:prstGeom prst="rightArrow">
               <a:avLst>
@@ -3213,1209 +4542,6 @@
                 <a:t>1</a:t>
               </a:r>
               <a:endParaRPr lang="en-GB" sz="1250" b="0" strike="noStrike" spc="-1" dirty="0">
-                <a:latin typeface="Arial"/>
-              </a:endParaRPr>
-            </a:p>
-          </p:txBody>
-        </p:sp>
-        <p:sp>
-          <p:nvSpPr>
-            <p:cNvPr id="46" name="CustomShape 7"/>
-            <p:cNvSpPr/>
-            <p:nvPr/>
-          </p:nvSpPr>
-          <p:spPr>
-            <a:xfrm rot="5400000">
-              <a:off x="3144583" y="1312560"/>
-              <a:ext cx="1241640" cy="338760"/>
-            </a:xfrm>
-            <a:prstGeom prst="rightArrow">
-              <a:avLst>
-                <a:gd name="adj1" fmla="val 100000"/>
-                <a:gd name="adj2" fmla="val 41015"/>
-              </a:avLst>
-            </a:prstGeom>
-            <a:solidFill>
-              <a:srgbClr val="6CC24A"/>
-            </a:solidFill>
-            <a:ln>
-              <a:noFill/>
-            </a:ln>
-          </p:spPr>
-          <p:style>
-            <a:lnRef idx="0">
-              <a:scrgbClr r="0" g="0" b="0"/>
-            </a:lnRef>
-            <a:fillRef idx="0">
-              <a:scrgbClr r="0" g="0" b="0"/>
-            </a:fillRef>
-            <a:effectRef idx="0">
-              <a:scrgbClr r="0" g="0" b="0"/>
-            </a:effectRef>
-            <a:fontRef idx="minor"/>
-          </p:style>
-          <p:txBody>
-            <a:bodyPr lIns="90000" tIns="45000" rIns="90000" bIns="45000" anchor="ctr">
-              <a:noAutofit/>
-            </a:bodyPr>
-            <a:lstStyle/>
-            <a:p>
-              <a:pPr algn="ctr">
-                <a:lnSpc>
-                  <a:spcPct val="100000"/>
-                </a:lnSpc>
-              </a:pPr>
-              <a:r>
-                <a:rPr lang="en-GB" sz="1100" b="0" strike="noStrike" spc="-1" dirty="0">
-                  <a:solidFill>
-                    <a:srgbClr val="FFFFFF"/>
-                  </a:solidFill>
-                  <a:latin typeface="Source Sans Pro"/>
-                </a:rPr>
-                <a:t>Green thread 2</a:t>
-              </a:r>
-              <a:endParaRPr lang="en-GB" sz="1100" b="0" strike="noStrike" spc="-1" dirty="0">
-                <a:latin typeface="Arial"/>
-              </a:endParaRPr>
-            </a:p>
-          </p:txBody>
-        </p:sp>
-        <p:sp>
-          <p:nvSpPr>
-            <p:cNvPr id="47" name="CustomShape 8"/>
-            <p:cNvSpPr/>
-            <p:nvPr/>
-          </p:nvSpPr>
-          <p:spPr>
-            <a:xfrm rot="5400000">
-              <a:off x="3498574" y="4296129"/>
-              <a:ext cx="533658" cy="338760"/>
-            </a:xfrm>
-            <a:prstGeom prst="rightArrow">
-              <a:avLst>
-                <a:gd name="adj1" fmla="val 100000"/>
-                <a:gd name="adj2" fmla="val 41015"/>
-              </a:avLst>
-            </a:prstGeom>
-            <a:solidFill>
-              <a:srgbClr val="6CC24A"/>
-            </a:solidFill>
-            <a:ln>
-              <a:noFill/>
-            </a:ln>
-          </p:spPr>
-          <p:style>
-            <a:lnRef idx="0">
-              <a:scrgbClr r="0" g="0" b="0"/>
-            </a:lnRef>
-            <a:fillRef idx="0">
-              <a:scrgbClr r="0" g="0" b="0"/>
-            </a:fillRef>
-            <a:effectRef idx="0">
-              <a:scrgbClr r="0" g="0" b="0"/>
-            </a:effectRef>
-            <a:fontRef idx="minor"/>
-          </p:style>
-          <p:txBody>
-            <a:bodyPr lIns="90000" tIns="45000" rIns="90000" bIns="45000" anchor="ctr">
-              <a:noAutofit/>
-            </a:bodyPr>
-            <a:lstStyle/>
-            <a:p>
-              <a:pPr algn="ctr">
-                <a:lnSpc>
-                  <a:spcPct val="100000"/>
-                </a:lnSpc>
-              </a:pPr>
-              <a:r>
-                <a:rPr lang="en-GB" sz="1250" b="0" strike="noStrike" spc="-1" dirty="0">
-                  <a:solidFill>
-                    <a:srgbClr val="FFFFFF"/>
-                  </a:solidFill>
-                  <a:latin typeface="Source Sans Pro"/>
-                </a:rPr>
-                <a:t>2</a:t>
-              </a:r>
-              <a:endParaRPr lang="en-GB" sz="1250" b="0" strike="noStrike" spc="-1" dirty="0">
-                <a:latin typeface="Arial"/>
-              </a:endParaRPr>
-            </a:p>
-          </p:txBody>
-        </p:sp>
-        <p:sp>
-          <p:nvSpPr>
-            <p:cNvPr id="48" name="CustomShape 9"/>
-            <p:cNvSpPr/>
-            <p:nvPr/>
-          </p:nvSpPr>
-          <p:spPr>
-            <a:xfrm rot="5400000">
-              <a:off x="4887851" y="2250949"/>
-              <a:ext cx="634778" cy="338760"/>
-            </a:xfrm>
-            <a:prstGeom prst="rightArrow">
-              <a:avLst>
-                <a:gd name="adj1" fmla="val 100000"/>
-                <a:gd name="adj2" fmla="val 41015"/>
-              </a:avLst>
-            </a:prstGeom>
-            <a:solidFill>
-              <a:srgbClr val="EE502E"/>
-            </a:solidFill>
-            <a:ln>
-              <a:noFill/>
-            </a:ln>
-          </p:spPr>
-          <p:style>
-            <a:lnRef idx="0">
-              <a:scrgbClr r="0" g="0" b="0"/>
-            </a:lnRef>
-            <a:fillRef idx="0">
-              <a:scrgbClr r="0" g="0" b="0"/>
-            </a:fillRef>
-            <a:effectRef idx="0">
-              <a:scrgbClr r="0" g="0" b="0"/>
-            </a:effectRef>
-            <a:fontRef idx="minor"/>
-          </p:style>
-        </p:sp>
-        <p:sp>
-          <p:nvSpPr>
-            <p:cNvPr id="49" name="CustomShape 10"/>
-            <p:cNvSpPr/>
-            <p:nvPr/>
-          </p:nvSpPr>
-          <p:spPr>
-            <a:xfrm rot="5400000">
-              <a:off x="9273086" y="2535482"/>
-              <a:ext cx="960392" cy="826650"/>
-            </a:xfrm>
-            <a:prstGeom prst="rightArrow">
-              <a:avLst>
-                <a:gd name="adj1" fmla="val 100000"/>
-                <a:gd name="adj2" fmla="val 41015"/>
-              </a:avLst>
-            </a:prstGeom>
-            <a:solidFill>
-              <a:srgbClr val="EE502E"/>
-            </a:solidFill>
-            <a:ln>
-              <a:noFill/>
-            </a:ln>
-          </p:spPr>
-          <p:style>
-            <a:lnRef idx="0">
-              <a:scrgbClr r="0" g="0" b="0"/>
-            </a:lnRef>
-            <a:fillRef idx="0">
-              <a:scrgbClr r="0" g="0" b="0"/>
-            </a:fillRef>
-            <a:effectRef idx="0">
-              <a:scrgbClr r="0" g="0" b="0"/>
-            </a:effectRef>
-            <a:fontRef idx="minor"/>
-          </p:style>
-          <p:txBody>
-            <a:bodyPr vert="vert270"/>
-            <a:lstStyle/>
-            <a:p>
-              <a:pPr algn="ctr"/>
-              <a:r>
-                <a:rPr lang="en-GB" sz="1100" dirty="0">
-                  <a:solidFill>
-                    <a:schemeClr val="bg1"/>
-                  </a:solidFill>
-                  <a:latin typeface="Source Sans Pro" panose="020B0503030403020204" pitchFamily="34" charset="0"/>
-                  <a:ea typeface="Source Sans Pro" panose="020B0503030403020204" pitchFamily="34" charset="0"/>
-                </a:rPr>
-                <a:t>Button Pressed Interrupt</a:t>
-              </a:r>
-            </a:p>
-            <a:p>
-              <a:pPr algn="ctr"/>
-              <a:r>
-                <a:rPr lang="en-GB" sz="1100" dirty="0">
-                  <a:solidFill>
-                    <a:schemeClr val="bg1"/>
-                  </a:solidFill>
-                  <a:latin typeface="Source Sans Pro" panose="020B0503030403020204" pitchFamily="34" charset="0"/>
-                  <a:ea typeface="Source Sans Pro" panose="020B0503030403020204" pitchFamily="34" charset="0"/>
-                </a:rPr>
-                <a:t>Handler</a:t>
-              </a:r>
-            </a:p>
-          </p:txBody>
-        </p:sp>
-        <p:sp>
-          <p:nvSpPr>
-            <p:cNvPr id="50" name="Line 11"/>
-            <p:cNvSpPr/>
-            <p:nvPr/>
-          </p:nvSpPr>
-          <p:spPr>
-            <a:xfrm>
-              <a:off x="3771900" y="2103480"/>
-              <a:ext cx="1263780" cy="0"/>
-            </a:xfrm>
-            <a:prstGeom prst="line">
-              <a:avLst/>
-            </a:prstGeom>
-            <a:ln w="28440">
-              <a:solidFill>
-                <a:srgbClr val="A9B1B5"/>
-              </a:solidFill>
-              <a:round/>
-              <a:tailEnd type="triangle" w="med" len="med"/>
-            </a:ln>
-          </p:spPr>
-          <p:style>
-            <a:lnRef idx="0">
-              <a:scrgbClr r="0" g="0" b="0"/>
-            </a:lnRef>
-            <a:fillRef idx="0">
-              <a:scrgbClr r="0" g="0" b="0"/>
-            </a:fillRef>
-            <a:effectRef idx="0">
-              <a:scrgbClr r="0" g="0" b="0"/>
-            </a:effectRef>
-            <a:fontRef idx="minor"/>
-          </p:style>
-        </p:sp>
-        <p:sp>
-          <p:nvSpPr>
-            <p:cNvPr id="51" name="Line 12"/>
-            <p:cNvSpPr/>
-            <p:nvPr/>
-          </p:nvSpPr>
-          <p:spPr>
-            <a:xfrm flipH="1">
-              <a:off x="4028727" y="2759505"/>
-              <a:ext cx="1176512" cy="0"/>
-            </a:xfrm>
-            <a:prstGeom prst="line">
-              <a:avLst/>
-            </a:prstGeom>
-            <a:ln w="28440">
-              <a:solidFill>
-                <a:srgbClr val="A9B1B5"/>
-              </a:solidFill>
-              <a:round/>
-              <a:tailEnd type="triangle" w="med" len="med"/>
-            </a:ln>
-          </p:spPr>
-          <p:style>
-            <a:lnRef idx="0">
-              <a:scrgbClr r="0" g="0" b="0"/>
-            </a:lnRef>
-            <a:fillRef idx="0">
-              <a:scrgbClr r="0" g="0" b="0"/>
-            </a:fillRef>
-            <a:effectRef idx="0">
-              <a:scrgbClr r="0" g="0" b="0"/>
-            </a:effectRef>
-            <a:fontRef idx="minor"/>
-          </p:style>
-        </p:sp>
-        <p:sp>
-          <p:nvSpPr>
-            <p:cNvPr id="52" name="Line 13"/>
-            <p:cNvSpPr/>
-            <p:nvPr/>
-          </p:nvSpPr>
-          <p:spPr>
-            <a:xfrm flipH="1">
-              <a:off x="4044580" y="3458812"/>
-              <a:ext cx="5708701" cy="0"/>
-            </a:xfrm>
-            <a:prstGeom prst="line">
-              <a:avLst/>
-            </a:prstGeom>
-            <a:ln w="28440">
-              <a:solidFill>
-                <a:srgbClr val="A9B1B5"/>
-              </a:solidFill>
-              <a:round/>
-              <a:tailEnd type="triangle" w="med" len="med"/>
-            </a:ln>
-          </p:spPr>
-          <p:style>
-            <a:lnRef idx="0">
-              <a:scrgbClr r="0" g="0" b="0"/>
-            </a:lnRef>
-            <a:fillRef idx="0">
-              <a:scrgbClr r="0" g="0" b="0"/>
-            </a:fillRef>
-            <a:effectRef idx="0">
-              <a:scrgbClr r="0" g="0" b="0"/>
-            </a:effectRef>
-            <a:fontRef idx="minor"/>
-          </p:style>
-        </p:sp>
-        <p:sp>
-          <p:nvSpPr>
-            <p:cNvPr id="53" name="CustomShape 14"/>
-            <p:cNvSpPr/>
-            <p:nvPr/>
-          </p:nvSpPr>
-          <p:spPr>
-            <a:xfrm>
-              <a:off x="3260880" y="4819383"/>
-              <a:ext cx="1929240" cy="455400"/>
-            </a:xfrm>
-            <a:prstGeom prst="rect">
-              <a:avLst/>
-            </a:prstGeom>
-            <a:noFill/>
-            <a:ln>
-              <a:noFill/>
-            </a:ln>
-          </p:spPr>
-          <p:style>
-            <a:lnRef idx="0">
-              <a:scrgbClr r="0" g="0" b="0"/>
-            </a:lnRef>
-            <a:fillRef idx="0">
-              <a:scrgbClr r="0" g="0" b="0"/>
-            </a:fillRef>
-            <a:effectRef idx="0">
-              <a:scrgbClr r="0" g="0" b="0"/>
-            </a:effectRef>
-            <a:fontRef idx="minor"/>
-          </p:style>
-          <p:txBody>
-            <a:bodyPr lIns="108000" tIns="45000" rIns="108000" bIns="45000">
-              <a:spAutoFit/>
-            </a:bodyPr>
-            <a:lstStyle/>
-            <a:p>
-              <a:pPr algn="ctr">
-                <a:lnSpc>
-                  <a:spcPct val="100000"/>
-                </a:lnSpc>
-              </a:pPr>
-              <a:r>
-                <a:rPr lang="en-GB" sz="1200" b="1" strike="noStrike" spc="-1" dirty="0">
-                  <a:solidFill>
-                    <a:srgbClr val="4B5357"/>
-                  </a:solidFill>
-                  <a:latin typeface="Source Sans Pro Light"/>
-                  <a:ea typeface="Source Sans Pro Light"/>
-                </a:rPr>
-                <a:t>The Java </a:t>
-              </a:r>
-              <a:endParaRPr lang="en-GB" sz="1200" b="0" strike="noStrike" spc="-1" dirty="0">
-                <a:latin typeface="Arial"/>
-              </a:endParaRPr>
-            </a:p>
-            <a:p>
-              <a:pPr algn="ctr">
-                <a:lnSpc>
-                  <a:spcPct val="100000"/>
-                </a:lnSpc>
-              </a:pPr>
-              <a:r>
-                <a:rPr lang="en-GB" sz="1200" b="1" strike="noStrike" spc="-1" dirty="0">
-                  <a:solidFill>
-                    <a:srgbClr val="4B5357"/>
-                  </a:solidFill>
-                  <a:latin typeface="Source Sans Pro Light"/>
-                  <a:ea typeface="Source Sans Pro Light"/>
-                </a:rPr>
-                <a:t>RTOS task</a:t>
-              </a:r>
-              <a:endParaRPr lang="en-GB" sz="1200" b="0" strike="noStrike" spc="-1" dirty="0">
-                <a:latin typeface="Arial"/>
-              </a:endParaRPr>
-            </a:p>
-          </p:txBody>
-        </p:sp>
-        <p:sp>
-          <p:nvSpPr>
-            <p:cNvPr id="54" name="CustomShape 15"/>
-            <p:cNvSpPr/>
-            <p:nvPr/>
-          </p:nvSpPr>
-          <p:spPr>
-            <a:xfrm>
-              <a:off x="9253085" y="4814572"/>
-              <a:ext cx="1006605" cy="460211"/>
-            </a:xfrm>
-            <a:prstGeom prst="rect">
-              <a:avLst/>
-            </a:prstGeom>
-            <a:noFill/>
-            <a:ln>
-              <a:noFill/>
-            </a:ln>
-          </p:spPr>
-          <p:style>
-            <a:lnRef idx="0">
-              <a:scrgbClr r="0" g="0" b="0"/>
-            </a:lnRef>
-            <a:fillRef idx="0">
-              <a:scrgbClr r="0" g="0" b="0"/>
-            </a:fillRef>
-            <a:effectRef idx="0">
-              <a:scrgbClr r="0" g="0" b="0"/>
-            </a:effectRef>
-            <a:fontRef idx="minor"/>
-          </p:style>
-          <p:txBody>
-            <a:bodyPr wrap="square" lIns="108000" tIns="45000" rIns="108000" bIns="45000">
-              <a:spAutoFit/>
-            </a:bodyPr>
-            <a:lstStyle/>
-            <a:p>
-              <a:pPr algn="ctr">
-                <a:lnSpc>
-                  <a:spcPct val="100000"/>
-                </a:lnSpc>
-              </a:pPr>
-              <a:r>
-                <a:rPr lang="en-GB" sz="1200" b="1" strike="noStrike" spc="-1" dirty="0">
-                  <a:solidFill>
-                    <a:srgbClr val="4B5357"/>
-                  </a:solidFill>
-                  <a:latin typeface="Source Sans Pro Light"/>
-                  <a:ea typeface="Source Sans Pro Light"/>
-                </a:rPr>
-                <a:t>The button IRQ</a:t>
-              </a:r>
-              <a:endParaRPr lang="en-GB" sz="1200" b="0" strike="noStrike" spc="-1" dirty="0">
-                <a:latin typeface="Arial"/>
-              </a:endParaRPr>
-            </a:p>
-          </p:txBody>
-        </p:sp>
-        <p:sp>
-          <p:nvSpPr>
-            <p:cNvPr id="55" name="CustomShape 16"/>
-            <p:cNvSpPr/>
-            <p:nvPr/>
-          </p:nvSpPr>
-          <p:spPr>
-            <a:xfrm>
-              <a:off x="5615280" y="2144137"/>
-              <a:ext cx="2621880" cy="250200"/>
-            </a:xfrm>
-            <a:prstGeom prst="rect">
-              <a:avLst/>
-            </a:prstGeom>
-            <a:noFill/>
-            <a:ln>
-              <a:noFill/>
-            </a:ln>
-          </p:spPr>
-          <p:style>
-            <a:lnRef idx="0">
-              <a:scrgbClr r="0" g="0" b="0"/>
-            </a:lnRef>
-            <a:fillRef idx="0">
-              <a:scrgbClr r="0" g="0" b="0"/>
-            </a:fillRef>
-            <a:effectRef idx="0">
-              <a:scrgbClr r="0" g="0" b="0"/>
-            </a:effectRef>
-            <a:fontRef idx="minor"/>
-          </p:style>
-          <p:txBody>
-            <a:bodyPr lIns="108000" tIns="45000" rIns="108000" bIns="45000">
-              <a:spAutoFit/>
-            </a:bodyPr>
-            <a:lstStyle/>
-            <a:p>
-              <a:pPr>
-                <a:lnSpc>
-                  <a:spcPct val="100000"/>
-                </a:lnSpc>
-              </a:pPr>
-              <a:r>
-                <a:rPr lang="en-GB" sz="1050" b="0" strike="noStrike" spc="-1" dirty="0" err="1">
-                  <a:solidFill>
-                    <a:srgbClr val="4B5357"/>
-                  </a:solidFill>
-                  <a:latin typeface="Consolas"/>
-                  <a:ea typeface="Source Sans Pro Light"/>
-                </a:rPr>
-                <a:t>SNI_getCurrentJavaThreadID</a:t>
-              </a:r>
-              <a:r>
-                <a:rPr lang="en-GB" sz="1050" b="0" strike="noStrike" spc="-1" dirty="0">
-                  <a:solidFill>
-                    <a:srgbClr val="4B5357"/>
-                  </a:solidFill>
-                  <a:latin typeface="Consolas"/>
-                  <a:ea typeface="Source Sans Pro Light"/>
-                </a:rPr>
-                <a:t>() : </a:t>
-              </a:r>
-              <a:r>
-                <a:rPr lang="en-GB" sz="1050" spc="-1" dirty="0">
-                  <a:solidFill>
-                    <a:srgbClr val="4B5357"/>
-                  </a:solidFill>
-                  <a:latin typeface="Consolas"/>
-                  <a:ea typeface="Source Sans Pro Light"/>
-                </a:rPr>
-                <a:t>2</a:t>
-              </a:r>
-              <a:endParaRPr lang="en-GB" sz="1050" b="0" strike="noStrike" spc="-1" dirty="0">
-                <a:latin typeface="Arial"/>
-              </a:endParaRPr>
-            </a:p>
-          </p:txBody>
-        </p:sp>
-        <p:sp>
-          <p:nvSpPr>
-            <p:cNvPr id="56" name="CustomShape 17"/>
-            <p:cNvSpPr/>
-            <p:nvPr/>
-          </p:nvSpPr>
-          <p:spPr>
-            <a:xfrm>
-              <a:off x="5615280" y="2426971"/>
-              <a:ext cx="3125700" cy="252462"/>
-            </a:xfrm>
-            <a:prstGeom prst="rect">
-              <a:avLst/>
-            </a:prstGeom>
-            <a:noFill/>
-            <a:ln>
-              <a:noFill/>
-            </a:ln>
-          </p:spPr>
-          <p:style>
-            <a:lnRef idx="0">
-              <a:scrgbClr r="0" g="0" b="0"/>
-            </a:lnRef>
-            <a:fillRef idx="0">
-              <a:scrgbClr r="0" g="0" b="0"/>
-            </a:fillRef>
-            <a:effectRef idx="0">
-              <a:scrgbClr r="0" g="0" b="0"/>
-            </a:effectRef>
-            <a:fontRef idx="minor"/>
-          </p:style>
-          <p:txBody>
-            <a:bodyPr wrap="square" lIns="108000" tIns="45000" rIns="108000" bIns="45000">
-              <a:spAutoFit/>
-            </a:bodyPr>
-            <a:lstStyle/>
-            <a:p>
-              <a:pPr>
-                <a:lnSpc>
-                  <a:spcPct val="100000"/>
-                </a:lnSpc>
-              </a:pPr>
-              <a:r>
-                <a:rPr lang="en-GB" sz="1050" b="0" strike="noStrike" spc="-1" dirty="0" err="1">
-                  <a:solidFill>
-                    <a:srgbClr val="4B5357"/>
-                  </a:solidFill>
-                  <a:latin typeface="Consolas"/>
-                  <a:ea typeface="Source Sans Pro Light"/>
-                </a:rPr>
-                <a:t>SNI_suspendCurrentJavaThread</a:t>
-              </a:r>
-              <a:r>
-                <a:rPr lang="en-GB" sz="1050" b="0" strike="noStrike" spc="-1" dirty="0">
-                  <a:solidFill>
-                    <a:srgbClr val="4B5357"/>
-                  </a:solidFill>
-                  <a:latin typeface="Consolas"/>
-                  <a:ea typeface="Source Sans Pro Light"/>
-                </a:rPr>
-                <a:t>(</a:t>
-              </a:r>
-              <a:r>
-                <a:rPr lang="en-GB" sz="1050" b="0" strike="noStrike" spc="-1" dirty="0" err="1">
-                  <a:solidFill>
-                    <a:srgbClr val="4B5357"/>
-                  </a:solidFill>
-                  <a:latin typeface="Consolas"/>
-                  <a:ea typeface="Source Sans Pro Light"/>
-                </a:rPr>
-                <a:t>callback</a:t>
-              </a:r>
-              <a:r>
-                <a:rPr lang="en-GB" sz="1050" b="0" strike="noStrike" spc="-1" dirty="0">
-                  <a:solidFill>
-                    <a:srgbClr val="4B5357"/>
-                  </a:solidFill>
-                  <a:latin typeface="Consolas"/>
-                  <a:ea typeface="Source Sans Pro Light"/>
-                </a:rPr>
-                <a:t>)</a:t>
-              </a:r>
-              <a:endParaRPr lang="en-GB" sz="1050" b="0" strike="noStrike" spc="-1" dirty="0">
-                <a:latin typeface="Arial"/>
-              </a:endParaRPr>
-            </a:p>
-          </p:txBody>
-        </p:sp>
-        <p:sp>
-          <p:nvSpPr>
-            <p:cNvPr id="57" name="CustomShape 18"/>
-            <p:cNvSpPr/>
-            <p:nvPr/>
-          </p:nvSpPr>
-          <p:spPr>
-            <a:xfrm>
-              <a:off x="4028728" y="3461632"/>
-              <a:ext cx="975360" cy="250200"/>
-            </a:xfrm>
-            <a:prstGeom prst="rect">
-              <a:avLst/>
-            </a:prstGeom>
-            <a:noFill/>
-            <a:ln>
-              <a:noFill/>
-            </a:ln>
-          </p:spPr>
-          <p:style>
-            <a:lnRef idx="0">
-              <a:scrgbClr r="0" g="0" b="0"/>
-            </a:lnRef>
-            <a:fillRef idx="0">
-              <a:scrgbClr r="0" g="0" b="0"/>
-            </a:fillRef>
-            <a:effectRef idx="0">
-              <a:scrgbClr r="0" g="0" b="0"/>
-            </a:effectRef>
-            <a:fontRef idx="minor"/>
-          </p:style>
-          <p:txBody>
-            <a:bodyPr wrap="square" lIns="108000" tIns="45000" rIns="108000" bIns="45000">
-              <a:spAutoFit/>
-            </a:bodyPr>
-            <a:lstStyle/>
-            <a:p>
-              <a:pPr algn="ctr">
-                <a:lnSpc>
-                  <a:spcPct val="100000"/>
-                </a:lnSpc>
-              </a:pPr>
-              <a:r>
-                <a:rPr lang="en-GB" sz="1050" b="0" strike="noStrike" spc="-1" dirty="0" err="1">
-                  <a:solidFill>
-                    <a:srgbClr val="4B5357"/>
-                  </a:solidFill>
-                  <a:latin typeface="Consolas"/>
-                  <a:ea typeface="Source Sans Pro Light"/>
-                </a:rPr>
-                <a:t>callback</a:t>
-              </a:r>
-              <a:r>
-                <a:rPr lang="en-GB" sz="1050" b="0" strike="noStrike" spc="-1" dirty="0">
-                  <a:solidFill>
-                    <a:srgbClr val="4B5357"/>
-                  </a:solidFill>
-                  <a:latin typeface="Consolas"/>
-                  <a:ea typeface="Source Sans Pro Light"/>
-                </a:rPr>
-                <a:t>()</a:t>
-              </a:r>
-              <a:endParaRPr lang="en-GB" sz="1050" b="0" strike="noStrike" spc="-1" dirty="0">
-                <a:latin typeface="Arial"/>
-              </a:endParaRPr>
-            </a:p>
-          </p:txBody>
-        </p:sp>
-        <p:sp>
-          <p:nvSpPr>
-            <p:cNvPr id="59" name="Line 20"/>
-            <p:cNvSpPr/>
-            <p:nvPr/>
-          </p:nvSpPr>
-          <p:spPr>
-            <a:xfrm flipH="1">
-              <a:off x="5205240" y="2555745"/>
-              <a:ext cx="428400" cy="360"/>
-            </a:xfrm>
-            <a:prstGeom prst="line">
-              <a:avLst/>
-            </a:prstGeom>
-            <a:ln w="28440">
-              <a:solidFill>
-                <a:srgbClr val="A9B1B5"/>
-              </a:solidFill>
-              <a:round/>
-              <a:tailEnd type="oval" w="med" len="med"/>
-            </a:ln>
-          </p:spPr>
-          <p:style>
-            <a:lnRef idx="0">
-              <a:scrgbClr r="0" g="0" b="0"/>
-            </a:lnRef>
-            <a:fillRef idx="0">
-              <a:scrgbClr r="0" g="0" b="0"/>
-            </a:fillRef>
-            <a:effectRef idx="0">
-              <a:scrgbClr r="0" g="0" b="0"/>
-            </a:effectRef>
-            <a:fontRef idx="minor"/>
-          </p:style>
-        </p:sp>
-        <p:sp>
-          <p:nvSpPr>
-            <p:cNvPr id="60" name="Line 21"/>
-            <p:cNvSpPr/>
-            <p:nvPr/>
-          </p:nvSpPr>
-          <p:spPr>
-            <a:xfrm flipH="1">
-              <a:off x="5209200" y="2283120"/>
-              <a:ext cx="428400" cy="360"/>
-            </a:xfrm>
-            <a:prstGeom prst="line">
-              <a:avLst/>
-            </a:prstGeom>
-            <a:ln w="28440">
-              <a:solidFill>
-                <a:srgbClr val="A9B1B5"/>
-              </a:solidFill>
-              <a:round/>
-              <a:tailEnd type="oval" w="med" len="med"/>
-            </a:ln>
-          </p:spPr>
-          <p:style>
-            <a:lnRef idx="0">
-              <a:scrgbClr r="0" g="0" b="0"/>
-            </a:lnRef>
-            <a:fillRef idx="0">
-              <a:scrgbClr r="0" g="0" b="0"/>
-            </a:fillRef>
-            <a:effectRef idx="0">
-              <a:scrgbClr r="0" g="0" b="0"/>
-            </a:effectRef>
-            <a:fontRef idx="minor"/>
-          </p:style>
-        </p:sp>
-        <p:sp>
-          <p:nvSpPr>
-            <p:cNvPr id="61" name="CustomShape 22"/>
-            <p:cNvSpPr/>
-            <p:nvPr/>
-          </p:nvSpPr>
-          <p:spPr>
-            <a:xfrm rot="5400000">
-              <a:off x="8751690" y="2663526"/>
-              <a:ext cx="3871219" cy="189033"/>
-            </a:xfrm>
-            <a:prstGeom prst="rightArrow">
-              <a:avLst>
-                <a:gd name="adj1" fmla="val 100000"/>
-                <a:gd name="adj2" fmla="val 50000"/>
-              </a:avLst>
-            </a:prstGeom>
-            <a:solidFill>
-              <a:srgbClr val="717D83"/>
-            </a:solidFill>
-            <a:ln>
-              <a:noFill/>
-            </a:ln>
-          </p:spPr>
-          <p:style>
-            <a:lnRef idx="0">
-              <a:scrgbClr r="0" g="0" b="0"/>
-            </a:lnRef>
-            <a:fillRef idx="0">
-              <a:scrgbClr r="0" g="0" b="0"/>
-            </a:fillRef>
-            <a:effectRef idx="0">
-              <a:scrgbClr r="0" g="0" b="0"/>
-            </a:effectRef>
-            <a:fontRef idx="minor"/>
-          </p:style>
-          <p:txBody>
-            <a:bodyPr lIns="90000" tIns="45000" rIns="90000" bIns="45000" anchor="ctr">
-              <a:noAutofit/>
-            </a:bodyPr>
-            <a:lstStyle/>
-            <a:p>
-              <a:pPr algn="ctr">
-                <a:lnSpc>
-                  <a:spcPct val="100000"/>
-                </a:lnSpc>
-              </a:pPr>
-              <a:r>
-                <a:rPr lang="en-GB" sz="1050" b="0" strike="noStrike" spc="-1">
-                  <a:solidFill>
-                    <a:srgbClr val="FFFFFF"/>
-                  </a:solidFill>
-                  <a:latin typeface="Source Sans Pro"/>
-                </a:rPr>
-                <a:t>Time</a:t>
-              </a:r>
-              <a:endParaRPr lang="en-GB" sz="1050" b="0" strike="noStrike" spc="-1">
-                <a:latin typeface="Arial"/>
-              </a:endParaRPr>
-            </a:p>
-          </p:txBody>
-        </p:sp>
-        <p:sp>
-          <p:nvSpPr>
-            <p:cNvPr id="24" name="CustomShape 16">
-              <a:extLst>
-                <a:ext uri="{FF2B5EF4-FFF2-40B4-BE49-F238E27FC236}">
-                  <a16:creationId xmlns:a16="http://schemas.microsoft.com/office/drawing/2014/main" id="{490B7A99-716D-4CB1-9D08-0D73792CB0C0}"/>
-                </a:ext>
-              </a:extLst>
-            </p:cNvPr>
-            <p:cNvSpPr/>
-            <p:nvPr/>
-          </p:nvSpPr>
-          <p:spPr>
-            <a:xfrm>
-              <a:off x="3935771" y="1844358"/>
-              <a:ext cx="1138594" cy="252462"/>
-            </a:xfrm>
-            <a:prstGeom prst="rect">
-              <a:avLst/>
-            </a:prstGeom>
-            <a:noFill/>
-            <a:ln>
-              <a:noFill/>
-            </a:ln>
-          </p:spPr>
-          <p:style>
-            <a:lnRef idx="0">
-              <a:scrgbClr r="0" g="0" b="0"/>
-            </a:lnRef>
-            <a:fillRef idx="0">
-              <a:scrgbClr r="0" g="0" b="0"/>
-            </a:fillRef>
-            <a:effectRef idx="0">
-              <a:scrgbClr r="0" g="0" b="0"/>
-            </a:effectRef>
-            <a:fontRef idx="minor"/>
-          </p:style>
-          <p:txBody>
-            <a:bodyPr wrap="square" lIns="108000" tIns="45000" rIns="108000" bIns="45000">
-              <a:spAutoFit/>
-            </a:bodyPr>
-            <a:lstStyle/>
-            <a:p>
-              <a:pPr algn="ctr">
-                <a:lnSpc>
-                  <a:spcPct val="100000"/>
-                </a:lnSpc>
-              </a:pPr>
-              <a:r>
-                <a:rPr lang="en-GB" sz="1050" b="0" strike="noStrike" spc="-1" dirty="0" err="1">
-                  <a:solidFill>
-                    <a:srgbClr val="4B5357"/>
-                  </a:solidFill>
-                  <a:latin typeface="Consolas"/>
-                  <a:ea typeface="Source Sans Pro Light"/>
-                </a:rPr>
-                <a:t>waitButton</a:t>
-              </a:r>
-              <a:r>
-                <a:rPr lang="en-GB" sz="1050" b="0" strike="noStrike" spc="-1" dirty="0">
-                  <a:solidFill>
-                    <a:srgbClr val="4B5357"/>
-                  </a:solidFill>
-                  <a:latin typeface="Consolas"/>
-                  <a:ea typeface="Source Sans Pro Light"/>
-                </a:rPr>
-                <a:t>()</a:t>
-              </a:r>
-              <a:endParaRPr lang="en-GB" sz="1050" b="0" strike="noStrike" spc="-1" dirty="0">
-                <a:latin typeface="Arial"/>
-              </a:endParaRPr>
-            </a:p>
-          </p:txBody>
-        </p:sp>
-        <p:sp>
-          <p:nvSpPr>
-            <p:cNvPr id="25" name="CustomShape 17">
-              <a:extLst>
-                <a:ext uri="{FF2B5EF4-FFF2-40B4-BE49-F238E27FC236}">
-                  <a16:creationId xmlns:a16="http://schemas.microsoft.com/office/drawing/2014/main" id="{0829D57E-25C5-4404-BBC8-0D2F7B84B1D8}"/>
-                </a:ext>
-              </a:extLst>
-            </p:cNvPr>
-            <p:cNvSpPr/>
-            <p:nvPr/>
-          </p:nvSpPr>
-          <p:spPr>
-            <a:xfrm>
-              <a:off x="5633640" y="3206350"/>
-              <a:ext cx="3741269" cy="252462"/>
-            </a:xfrm>
-            <a:prstGeom prst="rect">
-              <a:avLst/>
-            </a:prstGeom>
-            <a:noFill/>
-            <a:ln>
-              <a:noFill/>
-            </a:ln>
-          </p:spPr>
-          <p:style>
-            <a:lnRef idx="0">
-              <a:scrgbClr r="0" g="0" b="0"/>
-            </a:lnRef>
-            <a:fillRef idx="0">
-              <a:scrgbClr r="0" g="0" b="0"/>
-            </a:fillRef>
-            <a:effectRef idx="0">
-              <a:scrgbClr r="0" g="0" b="0"/>
-            </a:effectRef>
-            <a:fontRef idx="minor"/>
-          </p:style>
-          <p:txBody>
-            <a:bodyPr wrap="square" lIns="108000" tIns="45000" rIns="108000" bIns="45000">
-              <a:spAutoFit/>
-            </a:bodyPr>
-            <a:lstStyle/>
-            <a:p>
-              <a:pPr>
-                <a:lnSpc>
-                  <a:spcPct val="100000"/>
-                </a:lnSpc>
-              </a:pPr>
-              <a:r>
-                <a:rPr lang="en-US" sz="1050" b="0" strike="noStrike" spc="-1" dirty="0" err="1">
-                  <a:solidFill>
-                    <a:srgbClr val="4B5357"/>
-                  </a:solidFill>
-                  <a:latin typeface="Consolas"/>
-                  <a:ea typeface="Source Sans Pro Light"/>
-                </a:rPr>
-                <a:t>SNI_resumeJavaThreadWithArg</a:t>
-              </a:r>
-              <a:r>
-                <a:rPr lang="en-US" sz="1050" b="0" strike="noStrike" spc="-1" dirty="0">
-                  <a:solidFill>
-                    <a:srgbClr val="4B5357"/>
-                  </a:solidFill>
-                  <a:latin typeface="Consolas"/>
-                  <a:ea typeface="Source Sans Pro Light"/>
-                </a:rPr>
-                <a:t>(2, </a:t>
-              </a:r>
-              <a:r>
-                <a:rPr lang="en-US" sz="1050" b="0" strike="noStrike" spc="-1" dirty="0" err="1">
-                  <a:solidFill>
-                    <a:srgbClr val="4B5357"/>
-                  </a:solidFill>
-                  <a:latin typeface="Consolas"/>
-                  <a:ea typeface="Source Sans Pro Light"/>
-                </a:rPr>
-                <a:t>button_index</a:t>
-              </a:r>
-              <a:r>
-                <a:rPr lang="en-US" sz="1050" b="0" strike="noStrike" spc="-1" dirty="0">
-                  <a:solidFill>
-                    <a:srgbClr val="4B5357"/>
-                  </a:solidFill>
-                  <a:latin typeface="Consolas"/>
-                  <a:ea typeface="Source Sans Pro Light"/>
-                </a:rPr>
-                <a:t>)</a:t>
-              </a:r>
-              <a:endParaRPr lang="en-GB" sz="1050" b="0" strike="noStrike" spc="-1" dirty="0">
-                <a:solidFill>
-                  <a:srgbClr val="4B5357"/>
-                </a:solidFill>
-                <a:latin typeface="Consolas"/>
-                <a:ea typeface="Source Sans Pro Light"/>
-              </a:endParaRPr>
-            </a:p>
-          </p:txBody>
-        </p:sp>
-        <p:sp>
-          <p:nvSpPr>
-            <p:cNvPr id="26" name="Line 12">
-              <a:extLst>
-                <a:ext uri="{FF2B5EF4-FFF2-40B4-BE49-F238E27FC236}">
-                  <a16:creationId xmlns:a16="http://schemas.microsoft.com/office/drawing/2014/main" id="{7FBF7DE5-71AA-4C66-AF0B-87F6CCD3A91B}"/>
-                </a:ext>
-              </a:extLst>
-            </p:cNvPr>
-            <p:cNvSpPr/>
-            <p:nvPr/>
-          </p:nvSpPr>
-          <p:spPr>
-            <a:xfrm>
-              <a:off x="4044583" y="3720772"/>
-              <a:ext cx="991097" cy="0"/>
-            </a:xfrm>
-            <a:prstGeom prst="line">
-              <a:avLst/>
-            </a:prstGeom>
-            <a:ln w="28440">
-              <a:solidFill>
-                <a:srgbClr val="A9B1B5"/>
-              </a:solidFill>
-              <a:round/>
-              <a:tailEnd type="triangle" w="med" len="med"/>
-            </a:ln>
-          </p:spPr>
-          <p:style>
-            <a:lnRef idx="0">
-              <a:scrgbClr r="0" g="0" b="0"/>
-            </a:lnRef>
-            <a:fillRef idx="0">
-              <a:scrgbClr r="0" g="0" b="0"/>
-            </a:fillRef>
-            <a:effectRef idx="0">
-              <a:scrgbClr r="0" g="0" b="0"/>
-            </a:effectRef>
-            <a:fontRef idx="minor"/>
-          </p:style>
-        </p:sp>
-        <p:sp>
-          <p:nvSpPr>
-            <p:cNvPr id="27" name="CustomShape 9">
-              <a:extLst>
-                <a:ext uri="{FF2B5EF4-FFF2-40B4-BE49-F238E27FC236}">
-                  <a16:creationId xmlns:a16="http://schemas.microsoft.com/office/drawing/2014/main" id="{BA7D2D2E-1F8D-473B-B813-8C0DC97545C3}"/>
-                </a:ext>
-              </a:extLst>
-            </p:cNvPr>
-            <p:cNvSpPr/>
-            <p:nvPr/>
-          </p:nvSpPr>
-          <p:spPr>
-            <a:xfrm rot="5400000">
-              <a:off x="4977234" y="3780742"/>
-              <a:ext cx="456363" cy="338760"/>
-            </a:xfrm>
-            <a:prstGeom prst="rightArrow">
-              <a:avLst>
-                <a:gd name="adj1" fmla="val 100000"/>
-                <a:gd name="adj2" fmla="val 41015"/>
-              </a:avLst>
-            </a:prstGeom>
-            <a:solidFill>
-              <a:srgbClr val="EE502E"/>
-            </a:solidFill>
-            <a:ln>
-              <a:noFill/>
-            </a:ln>
-          </p:spPr>
-          <p:style>
-            <a:lnRef idx="0">
-              <a:scrgbClr r="0" g="0" b="0"/>
-            </a:lnRef>
-            <a:fillRef idx="0">
-              <a:scrgbClr r="0" g="0" b="0"/>
-            </a:fillRef>
-            <a:effectRef idx="0">
-              <a:scrgbClr r="0" g="0" b="0"/>
-            </a:effectRef>
-            <a:fontRef idx="minor"/>
-          </p:style>
-          <p:txBody>
-            <a:bodyPr/>
-            <a:lstStyle/>
-            <a:p>
-              <a:endParaRPr lang="en-US" sz="1200" dirty="0"/>
-            </a:p>
-          </p:txBody>
-        </p:sp>
-        <p:sp>
-          <p:nvSpPr>
-            <p:cNvPr id="28" name="Line 12">
-              <a:extLst>
-                <a:ext uri="{FF2B5EF4-FFF2-40B4-BE49-F238E27FC236}">
-                  <a16:creationId xmlns:a16="http://schemas.microsoft.com/office/drawing/2014/main" id="{B38506DA-FB22-4B7B-9CAF-3FA140565C2B}"/>
-                </a:ext>
-              </a:extLst>
-            </p:cNvPr>
-            <p:cNvSpPr/>
-            <p:nvPr/>
-          </p:nvSpPr>
-          <p:spPr>
-            <a:xfrm flipH="1">
-              <a:off x="3934784" y="4195502"/>
-              <a:ext cx="1270456" cy="1"/>
-            </a:xfrm>
-            <a:prstGeom prst="line">
-              <a:avLst/>
-            </a:prstGeom>
-            <a:ln w="28440">
-              <a:solidFill>
-                <a:srgbClr val="A9B1B5"/>
-              </a:solidFill>
-              <a:round/>
-              <a:tailEnd type="triangle" w="med" len="med"/>
-            </a:ln>
-          </p:spPr>
-          <p:style>
-            <a:lnRef idx="0">
-              <a:scrgbClr r="0" g="0" b="0"/>
-            </a:lnRef>
-            <a:fillRef idx="0">
-              <a:scrgbClr r="0" g="0" b="0"/>
-            </a:fillRef>
-            <a:effectRef idx="0">
-              <a:scrgbClr r="0" g="0" b="0"/>
-            </a:effectRef>
-            <a:fontRef idx="minor"/>
-          </p:style>
-        </p:sp>
-        <p:sp>
-          <p:nvSpPr>
-            <p:cNvPr id="31" name="CustomShape 18">
-              <a:extLst>
-                <a:ext uri="{FF2B5EF4-FFF2-40B4-BE49-F238E27FC236}">
-                  <a16:creationId xmlns:a16="http://schemas.microsoft.com/office/drawing/2014/main" id="{735B9515-BDB3-4986-9AD7-6B17EA9B42B7}"/>
-                </a:ext>
-              </a:extLst>
-            </p:cNvPr>
-            <p:cNvSpPr/>
-            <p:nvPr/>
-          </p:nvSpPr>
-          <p:spPr>
-            <a:xfrm>
-              <a:off x="3954954" y="3934099"/>
-              <a:ext cx="1122909" cy="252462"/>
-            </a:xfrm>
-            <a:prstGeom prst="rect">
-              <a:avLst/>
-            </a:prstGeom>
-            <a:noFill/>
-            <a:ln>
-              <a:noFill/>
-            </a:ln>
-          </p:spPr>
-          <p:style>
-            <a:lnRef idx="0">
-              <a:scrgbClr r="0" g="0" b="0"/>
-            </a:lnRef>
-            <a:fillRef idx="0">
-              <a:scrgbClr r="0" g="0" b="0"/>
-            </a:fillRef>
-            <a:effectRef idx="0">
-              <a:scrgbClr r="0" g="0" b="0"/>
-            </a:effectRef>
-            <a:fontRef idx="minor"/>
-          </p:style>
-          <p:txBody>
-            <a:bodyPr wrap="square" lIns="108000" tIns="45000" rIns="108000" bIns="45000">
-              <a:spAutoFit/>
-            </a:bodyPr>
-            <a:lstStyle/>
-            <a:p>
-              <a:pPr algn="ctr">
-                <a:lnSpc>
-                  <a:spcPct val="100000"/>
-                </a:lnSpc>
-              </a:pPr>
-              <a:r>
-                <a:rPr lang="en-GB" sz="1050" b="0" strike="noStrike" spc="-1" dirty="0" err="1">
-                  <a:solidFill>
-                    <a:srgbClr val="4B5357"/>
-                  </a:solidFill>
-                  <a:latin typeface="Consolas"/>
-                  <a:ea typeface="Source Sans Pro Light"/>
-                </a:rPr>
-                <a:t>button_index</a:t>
-              </a:r>
-              <a:endParaRPr lang="en-GB" sz="1050" b="0" strike="noStrike" spc="-1" dirty="0">
                 <a:latin typeface="Arial"/>
               </a:endParaRPr>
             </a:p>

</xml_diff>